<commit_message>
Update after class 1
</commit_message>
<xml_diff>
--- a/CSC3510 S2021/Lectures/01 IntroductionToTesting.pptx
+++ b/CSC3510 S2021/Lectures/01 IntroductionToTesting.pptx
@@ -5,14 +5,14 @@
     <p:sldMasterId id="2147483958" r:id="rId1"/>
   </p:sldMasterIdLst>
   <p:notesMasterIdLst>
-    <p:notesMasterId r:id="rId36"/>
+    <p:notesMasterId r:id="rId37"/>
   </p:notesMasterIdLst>
   <p:sldIdLst>
     <p:sldId id="555" r:id="rId2"/>
     <p:sldId id="741" r:id="rId3"/>
     <p:sldId id="742" r:id="rId4"/>
     <p:sldId id="743" r:id="rId5"/>
-    <p:sldId id="708" r:id="rId6"/>
+    <p:sldId id="746" r:id="rId6"/>
     <p:sldId id="707" r:id="rId7"/>
     <p:sldId id="709" r:id="rId8"/>
     <p:sldId id="710" r:id="rId9"/>
@@ -25,23 +25,24 @@
     <p:sldId id="721" r:id="rId16"/>
     <p:sldId id="722" r:id="rId17"/>
     <p:sldId id="723" r:id="rId18"/>
-    <p:sldId id="727" r:id="rId19"/>
-    <p:sldId id="732" r:id="rId20"/>
-    <p:sldId id="734" r:id="rId21"/>
-    <p:sldId id="735" r:id="rId22"/>
-    <p:sldId id="736" r:id="rId23"/>
-    <p:sldId id="738" r:id="rId24"/>
-    <p:sldId id="739" r:id="rId25"/>
-    <p:sldId id="625" r:id="rId26"/>
-    <p:sldId id="627" r:id="rId27"/>
-    <p:sldId id="633" r:id="rId28"/>
-    <p:sldId id="634" r:id="rId29"/>
-    <p:sldId id="628" r:id="rId30"/>
-    <p:sldId id="740" r:id="rId31"/>
-    <p:sldId id="631" r:id="rId32"/>
-    <p:sldId id="630" r:id="rId33"/>
-    <p:sldId id="632" r:id="rId34"/>
-    <p:sldId id="744" r:id="rId35"/>
+    <p:sldId id="745" r:id="rId19"/>
+    <p:sldId id="727" r:id="rId20"/>
+    <p:sldId id="732" r:id="rId21"/>
+    <p:sldId id="734" r:id="rId22"/>
+    <p:sldId id="735" r:id="rId23"/>
+    <p:sldId id="736" r:id="rId24"/>
+    <p:sldId id="738" r:id="rId25"/>
+    <p:sldId id="739" r:id="rId26"/>
+    <p:sldId id="625" r:id="rId27"/>
+    <p:sldId id="627" r:id="rId28"/>
+    <p:sldId id="633" r:id="rId29"/>
+    <p:sldId id="634" r:id="rId30"/>
+    <p:sldId id="628" r:id="rId31"/>
+    <p:sldId id="740" r:id="rId32"/>
+    <p:sldId id="631" r:id="rId33"/>
+    <p:sldId id="630" r:id="rId34"/>
+    <p:sldId id="632" r:id="rId35"/>
+    <p:sldId id="744" r:id="rId36"/>
   </p:sldIdLst>
   <p:sldSz cx="12192000" cy="6858000"/>
   <p:notesSz cx="6858000" cy="9144000"/>
@@ -230,7 +231,7 @@
           <a:p>
             <a:fld id="{C8AEADBA-F76D-42CB-AAEA-5899A162C59D}" type="datetimeFigureOut">
               <a:rPr lang="en-US" smtClean="0"/>
-              <a:t>12/12/2020</a:t>
+              <a:t>1/11/2021</a:t>
             </a:fld>
             <a:endParaRPr lang="en-US"/>
           </a:p>
@@ -716,7 +717,7 @@
           <a:p>
             <a:fld id="{83777DF0-4DA5-40CD-8FA1-5F589D66E613}" type="datetimeFigureOut">
               <a:rPr lang="en-US" smtClean="0"/>
-              <a:t>12/12/2020</a:t>
+              <a:t>1/11/2021</a:t>
             </a:fld>
             <a:endParaRPr lang="en-US"/>
           </a:p>
@@ -886,7 +887,7 @@
           <a:p>
             <a:fld id="{83777DF0-4DA5-40CD-8FA1-5F589D66E613}" type="datetimeFigureOut">
               <a:rPr lang="en-US" smtClean="0"/>
-              <a:t>12/12/2020</a:t>
+              <a:t>1/11/2021</a:t>
             </a:fld>
             <a:endParaRPr lang="en-US"/>
           </a:p>
@@ -1066,7 +1067,7 @@
           <a:p>
             <a:fld id="{83777DF0-4DA5-40CD-8FA1-5F589D66E613}" type="datetimeFigureOut">
               <a:rPr lang="en-US" smtClean="0"/>
-              <a:t>12/12/2020</a:t>
+              <a:t>1/11/2021</a:t>
             </a:fld>
             <a:endParaRPr lang="en-US"/>
           </a:p>
@@ -1236,7 +1237,7 @@
           <a:p>
             <a:fld id="{83777DF0-4DA5-40CD-8FA1-5F589D66E613}" type="datetimeFigureOut">
               <a:rPr lang="en-US" smtClean="0"/>
-              <a:t>12/12/2020</a:t>
+              <a:t>1/11/2021</a:t>
             </a:fld>
             <a:endParaRPr lang="en-US"/>
           </a:p>
@@ -1482,7 +1483,7 @@
           <a:p>
             <a:fld id="{83777DF0-4DA5-40CD-8FA1-5F589D66E613}" type="datetimeFigureOut">
               <a:rPr lang="en-US" smtClean="0"/>
-              <a:t>12/12/2020</a:t>
+              <a:t>1/11/2021</a:t>
             </a:fld>
             <a:endParaRPr lang="en-US"/>
           </a:p>
@@ -1714,7 +1715,7 @@
           <a:p>
             <a:fld id="{83777DF0-4DA5-40CD-8FA1-5F589D66E613}" type="datetimeFigureOut">
               <a:rPr lang="en-US" smtClean="0"/>
-              <a:t>12/12/2020</a:t>
+              <a:t>1/11/2021</a:t>
             </a:fld>
             <a:endParaRPr lang="en-US"/>
           </a:p>
@@ -2081,7 +2082,7 @@
           <a:p>
             <a:fld id="{83777DF0-4DA5-40CD-8FA1-5F589D66E613}" type="datetimeFigureOut">
               <a:rPr lang="en-US" smtClean="0"/>
-              <a:t>12/12/2020</a:t>
+              <a:t>1/11/2021</a:t>
             </a:fld>
             <a:endParaRPr lang="en-US"/>
           </a:p>
@@ -2199,7 +2200,7 @@
           <a:p>
             <a:fld id="{83777DF0-4DA5-40CD-8FA1-5F589D66E613}" type="datetimeFigureOut">
               <a:rPr lang="en-US" smtClean="0"/>
-              <a:t>12/12/2020</a:t>
+              <a:t>1/11/2021</a:t>
             </a:fld>
             <a:endParaRPr lang="en-US"/>
           </a:p>
@@ -2294,7 +2295,7 @@
           <a:p>
             <a:fld id="{83777DF0-4DA5-40CD-8FA1-5F589D66E613}" type="datetimeFigureOut">
               <a:rPr lang="en-US" smtClean="0"/>
-              <a:t>12/12/2020</a:t>
+              <a:t>1/11/2021</a:t>
             </a:fld>
             <a:endParaRPr lang="en-US"/>
           </a:p>
@@ -2571,7 +2572,7 @@
           <a:p>
             <a:fld id="{83777DF0-4DA5-40CD-8FA1-5F589D66E613}" type="datetimeFigureOut">
               <a:rPr lang="en-US" smtClean="0"/>
-              <a:t>12/12/2020</a:t>
+              <a:t>1/11/2021</a:t>
             </a:fld>
             <a:endParaRPr lang="en-US"/>
           </a:p>
@@ -2828,7 +2829,7 @@
           <a:p>
             <a:fld id="{83777DF0-4DA5-40CD-8FA1-5F589D66E613}" type="datetimeFigureOut">
               <a:rPr lang="en-US" smtClean="0"/>
-              <a:t>12/12/2020</a:t>
+              <a:t>1/11/2021</a:t>
             </a:fld>
             <a:endParaRPr lang="en-US"/>
           </a:p>
@@ -3048,7 +3049,7 @@
           <a:p>
             <a:fld id="{83777DF0-4DA5-40CD-8FA1-5F589D66E613}" type="datetimeFigureOut">
               <a:rPr lang="en-US" smtClean="0"/>
-              <a:t>12/12/2020</a:t>
+              <a:t>1/11/2021</a:t>
             </a:fld>
             <a:endParaRPr lang="en-US"/>
           </a:p>
@@ -4283,7 +4284,7 @@
         </p:nvSpPr>
         <p:spPr>
           <a:xfrm>
-            <a:off x="-64770" y="1397651"/>
+            <a:off x="273897" y="1374547"/>
             <a:ext cx="8664551" cy="830997"/>
           </a:xfrm>
           <a:prstGeom prst="rect">
@@ -4647,6 +4648,50 @@
           </a:prstGeom>
         </p:spPr>
       </p:pic>
+      <p:sp>
+        <p:nvSpPr>
+          <p:cNvPr id="5" name="TextBox 4"/>
+          <p:cNvSpPr txBox="1"/>
+          <p:nvPr/>
+        </p:nvSpPr>
+        <p:spPr>
+          <a:xfrm>
+            <a:off x="6223000" y="1472743"/>
+            <a:ext cx="3150221" cy="923330"/>
+          </a:xfrm>
+          <a:prstGeom prst="rect">
+            <a:avLst/>
+          </a:prstGeom>
+          <a:solidFill>
+            <a:schemeClr val="accent1">
+              <a:lumMod val="20000"/>
+              <a:lumOff val="80000"/>
+            </a:schemeClr>
+          </a:solidFill>
+        </p:spPr>
+        <p:txBody>
+          <a:bodyPr wrap="none" rtlCol="0">
+            <a:spAutoFit/>
+          </a:bodyPr>
+          <a:lstStyle/>
+          <a:p>
+            <a:r>
+              <a:rPr lang="en-US" dirty="0" smtClean="0"/>
+              <a:t>Do part II from Worksheet now </a:t>
+            </a:r>
+          </a:p>
+          <a:p>
+            <a:endParaRPr lang="en-US" dirty="0" smtClean="0"/>
+          </a:p>
+          <a:p>
+            <a:r>
+              <a:rPr lang="en-US" dirty="0" smtClean="0"/>
+              <a:t>How many combinations</a:t>
+            </a:r>
+            <a:endParaRPr lang="en-US" dirty="0"/>
+          </a:p>
+        </p:txBody>
+      </p:sp>
     </p:spTree>
     <p:extLst>
       <p:ext uri="{BB962C8B-B14F-4D97-AF65-F5344CB8AC3E}">
@@ -5092,7 +5137,7 @@
         </p:blipFill>
         <p:spPr>
           <a:xfrm>
-            <a:off x="3758959" y="5152641"/>
+            <a:off x="5604692" y="2394776"/>
             <a:ext cx="5074847" cy="1552959"/>
           </a:xfrm>
           <a:prstGeom prst="rect">
@@ -5693,6 +5738,294 @@
       </p:sp>
       <p:sp>
         <p:nvSpPr>
+          <p:cNvPr id="7" name="TextBox 6"/>
+          <p:cNvSpPr txBox="1"/>
+          <p:nvPr/>
+        </p:nvSpPr>
+        <p:spPr>
+          <a:xfrm>
+            <a:off x="285750" y="1502459"/>
+            <a:ext cx="4821833" cy="461665"/>
+          </a:xfrm>
+          <a:prstGeom prst="rect">
+            <a:avLst/>
+          </a:prstGeom>
+          <a:solidFill>
+            <a:srgbClr val="FFFF00"/>
+          </a:solidFill>
+        </p:spPr>
+        <p:txBody>
+          <a:bodyPr wrap="none" rtlCol="0">
+            <a:spAutoFit/>
+          </a:bodyPr>
+          <a:lstStyle/>
+          <a:p>
+            <a:r>
+              <a:rPr lang="en-US" sz="2400" dirty="0"/>
+              <a:t>Module Specification: Don’t look at it</a:t>
+            </a:r>
+            <a:endParaRPr lang="en-US" sz="2400" dirty="0">
+              <a:latin typeface="Courier New" panose="02070309020205020404" pitchFamily="49" charset="0"/>
+              <a:cs typeface="Courier New" panose="02070309020205020404" pitchFamily="49" charset="0"/>
+            </a:endParaRPr>
+          </a:p>
+        </p:txBody>
+      </p:sp>
+      <p:sp>
+        <p:nvSpPr>
+          <p:cNvPr id="3" name="TextBox 2"/>
+          <p:cNvSpPr txBox="1"/>
+          <p:nvPr/>
+        </p:nvSpPr>
+        <p:spPr>
+          <a:xfrm>
+            <a:off x="6223000" y="1472743"/>
+            <a:ext cx="4787080" cy="923330"/>
+          </a:xfrm>
+          <a:prstGeom prst="rect">
+            <a:avLst/>
+          </a:prstGeom>
+          <a:solidFill>
+            <a:schemeClr val="accent1">
+              <a:lumMod val="20000"/>
+              <a:lumOff val="80000"/>
+            </a:schemeClr>
+          </a:solidFill>
+        </p:spPr>
+        <p:txBody>
+          <a:bodyPr wrap="none" rtlCol="0">
+            <a:spAutoFit/>
+          </a:bodyPr>
+          <a:lstStyle/>
+          <a:p>
+            <a:r>
+              <a:rPr lang="en-US" dirty="0" smtClean="0"/>
+              <a:t>Do part III from Worksheet now </a:t>
+            </a:r>
+          </a:p>
+          <a:p>
+            <a:endParaRPr lang="en-US" dirty="0"/>
+          </a:p>
+          <a:p>
+            <a:r>
+              <a:rPr lang="en-US" dirty="0" smtClean="0"/>
+              <a:t>Develop a set of test cases for 100 code coverage</a:t>
+            </a:r>
+            <a:endParaRPr lang="en-US" dirty="0"/>
+          </a:p>
+        </p:txBody>
+      </p:sp>
+    </p:spTree>
+    <p:extLst>
+      <p:ext uri="{BB962C8B-B14F-4D97-AF65-F5344CB8AC3E}">
+        <p14:creationId xmlns:p14="http://schemas.microsoft.com/office/powerpoint/2010/main" val="1534779848"/>
+      </p:ext>
+    </p:extLst>
+  </p:cSld>
+  <p:clrMapOvr>
+    <a:masterClrMapping/>
+  </p:clrMapOvr>
+</p:sld>
+</file>
+
+<file path=ppt/slides/slide19.xml><?xml version="1.0" encoding="utf-8"?>
+<p:sld xmlns:a="http://schemas.openxmlformats.org/drawingml/2006/main" xmlns:r="http://schemas.openxmlformats.org/officeDocument/2006/relationships" xmlns:p="http://schemas.openxmlformats.org/presentationml/2006/main">
+  <p:cSld>
+    <p:spTree>
+      <p:nvGrpSpPr>
+        <p:cNvPr id="1" name=""/>
+        <p:cNvGrpSpPr/>
+        <p:nvPr/>
+      </p:nvGrpSpPr>
+      <p:grpSpPr>
+        <a:xfrm>
+          <a:off x="0" y="0"/>
+          <a:ext cx="0" cy="0"/>
+          <a:chOff x="0" y="0"/>
+          <a:chExt cx="0" cy="0"/>
+        </a:xfrm>
+      </p:grpSpPr>
+      <p:sp>
+        <p:nvSpPr>
+          <p:cNvPr id="2" name="Title 1"/>
+          <p:cNvSpPr>
+            <a:spLocks noGrp="1"/>
+          </p:cNvSpPr>
+          <p:nvPr>
+            <p:ph type="title"/>
+          </p:nvPr>
+        </p:nvSpPr>
+        <p:spPr>
+          <a:xfrm>
+            <a:off x="121920" y="91026"/>
+            <a:ext cx="11003280" cy="1325563"/>
+          </a:xfrm>
+        </p:spPr>
+        <p:txBody>
+          <a:bodyPr/>
+          <a:lstStyle/>
+          <a:p>
+            <a:r>
+              <a:rPr lang="en-US" dirty="0"/>
+              <a:t>White Box Testing Statement Coverage example </a:t>
+            </a:r>
+          </a:p>
+        </p:txBody>
+      </p:sp>
+      <p:sp>
+        <p:nvSpPr>
+          <p:cNvPr id="4" name="TextBox 3"/>
+          <p:cNvSpPr txBox="1"/>
+          <p:nvPr/>
+        </p:nvSpPr>
+        <p:spPr>
+          <a:xfrm>
+            <a:off x="570885" y="2828022"/>
+            <a:ext cx="7115791" cy="2308324"/>
+          </a:xfrm>
+          <a:prstGeom prst="rect">
+            <a:avLst/>
+          </a:prstGeom>
+          <a:solidFill>
+            <a:srgbClr val="FFFF00"/>
+          </a:solidFill>
+        </p:spPr>
+        <p:txBody>
+          <a:bodyPr wrap="square" rtlCol="0">
+            <a:spAutoFit/>
+          </a:bodyPr>
+          <a:lstStyle/>
+          <a:p>
+            <a:pPr marL="457200" indent="-457200">
+              <a:buFont typeface="+mj-lt"/>
+              <a:buAutoNum type="arabicPeriod"/>
+            </a:pPr>
+            <a:r>
+              <a:rPr lang="en-US" sz="2400" dirty="0" err="1">
+                <a:latin typeface="Courier New" panose="02070309020205020404" pitchFamily="49" charset="0"/>
+                <a:cs typeface="Courier New" panose="02070309020205020404" pitchFamily="49" charset="0"/>
+              </a:rPr>
+              <a:t>def</a:t>
+            </a:r>
+            <a:r>
+              <a:rPr lang="en-US" sz="2400" dirty="0">
+                <a:latin typeface="Courier New" panose="02070309020205020404" pitchFamily="49" charset="0"/>
+                <a:cs typeface="Courier New" panose="02070309020205020404" pitchFamily="49" charset="0"/>
+              </a:rPr>
+              <a:t> </a:t>
+            </a:r>
+            <a:r>
+              <a:rPr lang="en-US" sz="2400" dirty="0" err="1">
+                <a:latin typeface="Courier New" panose="02070309020205020404" pitchFamily="49" charset="0"/>
+                <a:cs typeface="Courier New" panose="02070309020205020404" pitchFamily="49" charset="0"/>
+              </a:rPr>
+              <a:t>print_sum</a:t>
+            </a:r>
+            <a:r>
+              <a:rPr lang="en-US" sz="2400" dirty="0">
+                <a:latin typeface="Courier New" panose="02070309020205020404" pitchFamily="49" charset="0"/>
+                <a:cs typeface="Courier New" panose="02070309020205020404" pitchFamily="49" charset="0"/>
+              </a:rPr>
+              <a:t>( a, b ):</a:t>
+            </a:r>
+          </a:p>
+          <a:p>
+            <a:pPr marL="457200" indent="-457200">
+              <a:buFont typeface="+mj-lt"/>
+              <a:buAutoNum type="arabicPeriod"/>
+            </a:pPr>
+            <a:r>
+              <a:rPr lang="en-US" sz="2400" dirty="0">
+                <a:latin typeface="Courier New" panose="02070309020205020404" pitchFamily="49" charset="0"/>
+                <a:cs typeface="Courier New" panose="02070309020205020404" pitchFamily="49" charset="0"/>
+              </a:rPr>
+              <a:t>    result = a + b</a:t>
+            </a:r>
+          </a:p>
+          <a:p>
+            <a:pPr marL="457200" indent="-457200">
+              <a:buFont typeface="+mj-lt"/>
+              <a:buAutoNum type="arabicPeriod"/>
+            </a:pPr>
+            <a:r>
+              <a:rPr lang="en-US" sz="2400" dirty="0">
+                <a:latin typeface="Courier New" panose="02070309020205020404" pitchFamily="49" charset="0"/>
+                <a:cs typeface="Courier New" panose="02070309020205020404" pitchFamily="49" charset="0"/>
+              </a:rPr>
+              <a:t>    if result &gt; 0:</a:t>
+            </a:r>
+          </a:p>
+          <a:p>
+            <a:pPr marL="457200" indent="-457200">
+              <a:buFont typeface="+mj-lt"/>
+              <a:buAutoNum type="arabicPeriod"/>
+            </a:pPr>
+            <a:r>
+              <a:rPr lang="en-US" sz="2400" dirty="0">
+                <a:latin typeface="Courier New" panose="02070309020205020404" pitchFamily="49" charset="0"/>
+                <a:cs typeface="Courier New" panose="02070309020205020404" pitchFamily="49" charset="0"/>
+              </a:rPr>
+              <a:t>	      print( </a:t>
+            </a:r>
+            <a:r>
+              <a:rPr lang="en-US" sz="2400" dirty="0" err="1">
+                <a:latin typeface="Courier New" panose="02070309020205020404" pitchFamily="49" charset="0"/>
+                <a:cs typeface="Courier New" panose="02070309020205020404" pitchFamily="49" charset="0"/>
+              </a:rPr>
+              <a:t>f“Red</a:t>
+            </a:r>
+            <a:r>
+              <a:rPr lang="en-US" sz="2400" dirty="0">
+                <a:latin typeface="Courier New" panose="02070309020205020404" pitchFamily="49" charset="0"/>
+                <a:cs typeface="Courier New" panose="02070309020205020404" pitchFamily="49" charset="0"/>
+              </a:rPr>
+              <a:t>:{result}”)</a:t>
+            </a:r>
+          </a:p>
+          <a:p>
+            <a:pPr marL="457200" indent="-457200">
+              <a:buFont typeface="+mj-lt"/>
+              <a:buAutoNum type="arabicPeriod"/>
+            </a:pPr>
+            <a:r>
+              <a:rPr lang="en-US" sz="2400" dirty="0">
+                <a:latin typeface="Courier New" panose="02070309020205020404" pitchFamily="49" charset="0"/>
+                <a:cs typeface="Courier New" panose="02070309020205020404" pitchFamily="49" charset="0"/>
+              </a:rPr>
+              <a:t>	  else if ( result &lt; 0 ):</a:t>
+            </a:r>
+          </a:p>
+          <a:p>
+            <a:pPr marL="457200" indent="-457200">
+              <a:buFont typeface="+mj-lt"/>
+              <a:buAutoNum type="arabicPeriod"/>
+            </a:pPr>
+            <a:r>
+              <a:rPr lang="en-US" sz="2400" dirty="0">
+                <a:latin typeface="Courier New" panose="02070309020205020404" pitchFamily="49" charset="0"/>
+                <a:cs typeface="Courier New" panose="02070309020205020404" pitchFamily="49" charset="0"/>
+              </a:rPr>
+              <a:t>	      print(</a:t>
+            </a:r>
+            <a:r>
+              <a:rPr lang="en-US" sz="2400" dirty="0" err="1">
+                <a:latin typeface="Courier New" panose="02070309020205020404" pitchFamily="49" charset="0"/>
+                <a:cs typeface="Courier New" panose="02070309020205020404" pitchFamily="49" charset="0"/>
+              </a:rPr>
+              <a:t>f“Blue</a:t>
+            </a:r>
+            <a:r>
+              <a:rPr lang="en-US" sz="2400" dirty="0">
+                <a:latin typeface="Courier New" panose="02070309020205020404" pitchFamily="49" charset="0"/>
+                <a:cs typeface="Courier New" panose="02070309020205020404" pitchFamily="49" charset="0"/>
+              </a:rPr>
+              <a:t>:{result}“)</a:t>
+            </a:r>
+          </a:p>
+        </p:txBody>
+      </p:sp>
+      <p:sp>
+        <p:nvSpPr>
           <p:cNvPr id="5" name="TextBox 4"/>
           <p:cNvSpPr txBox="1"/>
           <p:nvPr/>
@@ -5900,7 +6233,185 @@
 </p:sld>
 </file>
 
-<file path=ppt/slides/slide19.xml><?xml version="1.0" encoding="utf-8"?>
+<file path=ppt/slides/slide2.xml><?xml version="1.0" encoding="utf-8"?>
+<p:sld xmlns:a="http://schemas.openxmlformats.org/drawingml/2006/main" xmlns:r="http://schemas.openxmlformats.org/officeDocument/2006/relationships" xmlns:p="http://schemas.openxmlformats.org/presentationml/2006/main">
+  <p:cSld>
+    <p:spTree>
+      <p:nvGrpSpPr>
+        <p:cNvPr id="1" name=""/>
+        <p:cNvGrpSpPr/>
+        <p:nvPr/>
+      </p:nvGrpSpPr>
+      <p:grpSpPr>
+        <a:xfrm>
+          <a:off x="0" y="0"/>
+          <a:ext cx="0" cy="0"/>
+          <a:chOff x="0" y="0"/>
+          <a:chExt cx="0" cy="0"/>
+        </a:xfrm>
+      </p:grpSpPr>
+      <p:sp>
+        <p:nvSpPr>
+          <p:cNvPr id="2" name="Title 1">
+            <a:extLst>
+              <a:ext uri="{FF2B5EF4-FFF2-40B4-BE49-F238E27FC236}">
+                <a16:creationId xmlns:a16="http://schemas.microsoft.com/office/drawing/2014/main" id="{36F29FE5-8EC4-4D04-9B2F-F7B2DDE128A1}"/>
+              </a:ext>
+            </a:extLst>
+          </p:cNvPr>
+          <p:cNvSpPr>
+            <a:spLocks noGrp="1"/>
+          </p:cNvSpPr>
+          <p:nvPr>
+            <p:ph type="title"/>
+          </p:nvPr>
+        </p:nvSpPr>
+        <p:spPr>
+          <a:xfrm>
+            <a:off x="367683" y="59134"/>
+            <a:ext cx="10515600" cy="819755"/>
+          </a:xfrm>
+        </p:spPr>
+        <p:txBody>
+          <a:bodyPr/>
+          <a:lstStyle/>
+          <a:p>
+            <a:r>
+              <a:rPr lang="en-US" dirty="0"/>
+              <a:t>A Real Area for Jobs </a:t>
+            </a:r>
+          </a:p>
+        </p:txBody>
+      </p:sp>
+      <p:sp>
+        <p:nvSpPr>
+          <p:cNvPr id="3" name="Content Placeholder 2">
+            <a:extLst>
+              <a:ext uri="{FF2B5EF4-FFF2-40B4-BE49-F238E27FC236}">
+                <a16:creationId xmlns:a16="http://schemas.microsoft.com/office/drawing/2014/main" id="{2E3A6BB4-5BBE-432D-93D7-C2DD213CA2FD}"/>
+              </a:ext>
+            </a:extLst>
+          </p:cNvPr>
+          <p:cNvSpPr>
+            <a:spLocks noGrp="1"/>
+          </p:cNvSpPr>
+          <p:nvPr>
+            <p:ph idx="1"/>
+          </p:nvPr>
+        </p:nvSpPr>
+        <p:spPr/>
+        <p:txBody>
+          <a:bodyPr/>
+          <a:lstStyle/>
+          <a:p>
+            <a:endParaRPr lang="en-US"/>
+          </a:p>
+        </p:txBody>
+      </p:sp>
+      <p:pic>
+        <p:nvPicPr>
+          <p:cNvPr id="5" name="Picture 4">
+            <a:extLst>
+              <a:ext uri="{FF2B5EF4-FFF2-40B4-BE49-F238E27FC236}">
+                <a16:creationId xmlns:a16="http://schemas.microsoft.com/office/drawing/2014/main" id="{4596145C-19D9-4CFC-B4A5-1090D5894295}"/>
+              </a:ext>
+            </a:extLst>
+          </p:cNvPr>
+          <p:cNvPicPr>
+            <a:picLocks noChangeAspect="1"/>
+          </p:cNvPicPr>
+          <p:nvPr/>
+        </p:nvPicPr>
+        <p:blipFill>
+          <a:blip r:embed="rId2"/>
+          <a:stretch>
+            <a:fillRect/>
+          </a:stretch>
+        </p:blipFill>
+        <p:spPr>
+          <a:xfrm>
+            <a:off x="6378466" y="151752"/>
+            <a:ext cx="4619625" cy="2914650"/>
+          </a:xfrm>
+          <a:prstGeom prst="rect">
+            <a:avLst/>
+          </a:prstGeom>
+        </p:spPr>
+      </p:pic>
+      <p:pic>
+        <p:nvPicPr>
+          <p:cNvPr id="7" name="Picture 6">
+            <a:extLst>
+              <a:ext uri="{FF2B5EF4-FFF2-40B4-BE49-F238E27FC236}">
+                <a16:creationId xmlns:a16="http://schemas.microsoft.com/office/drawing/2014/main" id="{C4DD3BE9-603A-4A43-9C96-B1BAD4B34BF9}"/>
+              </a:ext>
+            </a:extLst>
+          </p:cNvPr>
+          <p:cNvPicPr>
+            <a:picLocks noChangeAspect="1"/>
+          </p:cNvPicPr>
+          <p:nvPr/>
+        </p:nvPicPr>
+        <p:blipFill>
+          <a:blip r:embed="rId3"/>
+          <a:stretch>
+            <a:fillRect/>
+          </a:stretch>
+        </p:blipFill>
+        <p:spPr>
+          <a:xfrm>
+            <a:off x="629875" y="742950"/>
+            <a:ext cx="5486400" cy="6115050"/>
+          </a:xfrm>
+          <a:prstGeom prst="rect">
+            <a:avLst/>
+          </a:prstGeom>
+        </p:spPr>
+      </p:pic>
+      <p:pic>
+        <p:nvPicPr>
+          <p:cNvPr id="9" name="Picture 8">
+            <a:extLst>
+              <a:ext uri="{FF2B5EF4-FFF2-40B4-BE49-F238E27FC236}">
+                <a16:creationId xmlns:a16="http://schemas.microsoft.com/office/drawing/2014/main" id="{1C6A326E-B64A-4F94-B662-1A25DF10E429}"/>
+              </a:ext>
+            </a:extLst>
+          </p:cNvPr>
+          <p:cNvPicPr>
+            <a:picLocks noChangeAspect="1"/>
+          </p:cNvPicPr>
+          <p:nvPr/>
+        </p:nvPicPr>
+        <p:blipFill>
+          <a:blip r:embed="rId4"/>
+          <a:stretch>
+            <a:fillRect/>
+          </a:stretch>
+        </p:blipFill>
+        <p:spPr>
+          <a:xfrm>
+            <a:off x="6324600" y="3515373"/>
+            <a:ext cx="5248275" cy="3190875"/>
+          </a:xfrm>
+          <a:prstGeom prst="rect">
+            <a:avLst/>
+          </a:prstGeom>
+        </p:spPr>
+      </p:pic>
+    </p:spTree>
+    <p:extLst>
+      <p:ext uri="{BB962C8B-B14F-4D97-AF65-F5344CB8AC3E}">
+        <p14:creationId xmlns:p14="http://schemas.microsoft.com/office/powerpoint/2010/main" val="2395587139"/>
+      </p:ext>
+    </p:extLst>
+  </p:cSld>
+  <p:clrMapOvr>
+    <a:masterClrMapping/>
+  </p:clrMapOvr>
+</p:sld>
+</file>
+
+<file path=ppt/slides/slide20.xml><?xml version="1.0" encoding="utf-8"?>
 <p:sld xmlns:a="http://schemas.openxmlformats.org/drawingml/2006/main" xmlns:r="http://schemas.openxmlformats.org/officeDocument/2006/relationships" xmlns:p="http://schemas.openxmlformats.org/presentationml/2006/main">
   <p:cSld>
     <p:spTree>
@@ -6091,185 +6602,7 @@
 </p:sld>
 </file>
 
-<file path=ppt/slides/slide2.xml><?xml version="1.0" encoding="utf-8"?>
-<p:sld xmlns:a="http://schemas.openxmlformats.org/drawingml/2006/main" xmlns:r="http://schemas.openxmlformats.org/officeDocument/2006/relationships" xmlns:p="http://schemas.openxmlformats.org/presentationml/2006/main">
-  <p:cSld>
-    <p:spTree>
-      <p:nvGrpSpPr>
-        <p:cNvPr id="1" name=""/>
-        <p:cNvGrpSpPr/>
-        <p:nvPr/>
-      </p:nvGrpSpPr>
-      <p:grpSpPr>
-        <a:xfrm>
-          <a:off x="0" y="0"/>
-          <a:ext cx="0" cy="0"/>
-          <a:chOff x="0" y="0"/>
-          <a:chExt cx="0" cy="0"/>
-        </a:xfrm>
-      </p:grpSpPr>
-      <p:sp>
-        <p:nvSpPr>
-          <p:cNvPr id="2" name="Title 1">
-            <a:extLst>
-              <a:ext uri="{FF2B5EF4-FFF2-40B4-BE49-F238E27FC236}">
-                <a16:creationId xmlns:a16="http://schemas.microsoft.com/office/drawing/2014/main" id="{36F29FE5-8EC4-4D04-9B2F-F7B2DDE128A1}"/>
-              </a:ext>
-            </a:extLst>
-          </p:cNvPr>
-          <p:cNvSpPr>
-            <a:spLocks noGrp="1"/>
-          </p:cNvSpPr>
-          <p:nvPr>
-            <p:ph type="title"/>
-          </p:nvPr>
-        </p:nvSpPr>
-        <p:spPr>
-          <a:xfrm>
-            <a:off x="367683" y="59134"/>
-            <a:ext cx="10515600" cy="819755"/>
-          </a:xfrm>
-        </p:spPr>
-        <p:txBody>
-          <a:bodyPr/>
-          <a:lstStyle/>
-          <a:p>
-            <a:r>
-              <a:rPr lang="en-US" dirty="0"/>
-              <a:t>A Real Area for Jobs </a:t>
-            </a:r>
-          </a:p>
-        </p:txBody>
-      </p:sp>
-      <p:sp>
-        <p:nvSpPr>
-          <p:cNvPr id="3" name="Content Placeholder 2">
-            <a:extLst>
-              <a:ext uri="{FF2B5EF4-FFF2-40B4-BE49-F238E27FC236}">
-                <a16:creationId xmlns:a16="http://schemas.microsoft.com/office/drawing/2014/main" id="{2E3A6BB4-5BBE-432D-93D7-C2DD213CA2FD}"/>
-              </a:ext>
-            </a:extLst>
-          </p:cNvPr>
-          <p:cNvSpPr>
-            <a:spLocks noGrp="1"/>
-          </p:cNvSpPr>
-          <p:nvPr>
-            <p:ph idx="1"/>
-          </p:nvPr>
-        </p:nvSpPr>
-        <p:spPr/>
-        <p:txBody>
-          <a:bodyPr/>
-          <a:lstStyle/>
-          <a:p>
-            <a:endParaRPr lang="en-US"/>
-          </a:p>
-        </p:txBody>
-      </p:sp>
-      <p:pic>
-        <p:nvPicPr>
-          <p:cNvPr id="5" name="Picture 4">
-            <a:extLst>
-              <a:ext uri="{FF2B5EF4-FFF2-40B4-BE49-F238E27FC236}">
-                <a16:creationId xmlns:a16="http://schemas.microsoft.com/office/drawing/2014/main" id="{4596145C-19D9-4CFC-B4A5-1090D5894295}"/>
-              </a:ext>
-            </a:extLst>
-          </p:cNvPr>
-          <p:cNvPicPr>
-            <a:picLocks noChangeAspect="1"/>
-          </p:cNvPicPr>
-          <p:nvPr/>
-        </p:nvPicPr>
-        <p:blipFill>
-          <a:blip r:embed="rId2"/>
-          <a:stretch>
-            <a:fillRect/>
-          </a:stretch>
-        </p:blipFill>
-        <p:spPr>
-          <a:xfrm>
-            <a:off x="6378466" y="151752"/>
-            <a:ext cx="4619625" cy="2914650"/>
-          </a:xfrm>
-          <a:prstGeom prst="rect">
-            <a:avLst/>
-          </a:prstGeom>
-        </p:spPr>
-      </p:pic>
-      <p:pic>
-        <p:nvPicPr>
-          <p:cNvPr id="7" name="Picture 6">
-            <a:extLst>
-              <a:ext uri="{FF2B5EF4-FFF2-40B4-BE49-F238E27FC236}">
-                <a16:creationId xmlns:a16="http://schemas.microsoft.com/office/drawing/2014/main" id="{C4DD3BE9-603A-4A43-9C96-B1BAD4B34BF9}"/>
-              </a:ext>
-            </a:extLst>
-          </p:cNvPr>
-          <p:cNvPicPr>
-            <a:picLocks noChangeAspect="1"/>
-          </p:cNvPicPr>
-          <p:nvPr/>
-        </p:nvPicPr>
-        <p:blipFill>
-          <a:blip r:embed="rId3"/>
-          <a:stretch>
-            <a:fillRect/>
-          </a:stretch>
-        </p:blipFill>
-        <p:spPr>
-          <a:xfrm>
-            <a:off x="629875" y="742950"/>
-            <a:ext cx="5486400" cy="6115050"/>
-          </a:xfrm>
-          <a:prstGeom prst="rect">
-            <a:avLst/>
-          </a:prstGeom>
-        </p:spPr>
-      </p:pic>
-      <p:pic>
-        <p:nvPicPr>
-          <p:cNvPr id="9" name="Picture 8">
-            <a:extLst>
-              <a:ext uri="{FF2B5EF4-FFF2-40B4-BE49-F238E27FC236}">
-                <a16:creationId xmlns:a16="http://schemas.microsoft.com/office/drawing/2014/main" id="{1C6A326E-B64A-4F94-B662-1A25DF10E429}"/>
-              </a:ext>
-            </a:extLst>
-          </p:cNvPr>
-          <p:cNvPicPr>
-            <a:picLocks noChangeAspect="1"/>
-          </p:cNvPicPr>
-          <p:nvPr/>
-        </p:nvPicPr>
-        <p:blipFill>
-          <a:blip r:embed="rId4"/>
-          <a:stretch>
-            <a:fillRect/>
-          </a:stretch>
-        </p:blipFill>
-        <p:spPr>
-          <a:xfrm>
-            <a:off x="6324600" y="3515373"/>
-            <a:ext cx="5248275" cy="3190875"/>
-          </a:xfrm>
-          <a:prstGeom prst="rect">
-            <a:avLst/>
-          </a:prstGeom>
-        </p:spPr>
-      </p:pic>
-    </p:spTree>
-    <p:extLst>
-      <p:ext uri="{BB962C8B-B14F-4D97-AF65-F5344CB8AC3E}">
-        <p14:creationId xmlns:p14="http://schemas.microsoft.com/office/powerpoint/2010/main" val="2395587139"/>
-      </p:ext>
-    </p:extLst>
-  </p:cSld>
-  <p:clrMapOvr>
-    <a:masterClrMapping/>
-  </p:clrMapOvr>
-</p:sld>
-</file>
-
-<file path=ppt/slides/slide20.xml><?xml version="1.0" encoding="utf-8"?>
+<file path=ppt/slides/slide21.xml><?xml version="1.0" encoding="utf-8"?>
 <p:sld xmlns:a="http://schemas.openxmlformats.org/drawingml/2006/main" xmlns:r="http://schemas.openxmlformats.org/officeDocument/2006/relationships" xmlns:p="http://schemas.openxmlformats.org/presentationml/2006/main">
   <p:cSld>
     <p:spTree>
@@ -6435,158 +6768,6 @@
 </p:sld>
 </file>
 
-<file path=ppt/slides/slide21.xml><?xml version="1.0" encoding="utf-8"?>
-<p:sld xmlns:a="http://schemas.openxmlformats.org/drawingml/2006/main" xmlns:r="http://schemas.openxmlformats.org/officeDocument/2006/relationships" xmlns:p="http://schemas.openxmlformats.org/presentationml/2006/main">
-  <p:cSld>
-    <p:spTree>
-      <p:nvGrpSpPr>
-        <p:cNvPr id="1" name=""/>
-        <p:cNvGrpSpPr/>
-        <p:nvPr/>
-      </p:nvGrpSpPr>
-      <p:grpSpPr>
-        <a:xfrm>
-          <a:off x="0" y="0"/>
-          <a:ext cx="0" cy="0"/>
-          <a:chOff x="0" y="0"/>
-          <a:chExt cx="0" cy="0"/>
-        </a:xfrm>
-      </p:grpSpPr>
-      <p:sp>
-        <p:nvSpPr>
-          <p:cNvPr id="5" name="TextBox 4">
-            <a:extLst>
-              <a:ext uri="{FF2B5EF4-FFF2-40B4-BE49-F238E27FC236}">
-                <a16:creationId xmlns:a16="http://schemas.microsoft.com/office/drawing/2014/main" id="{ECF59612-2636-483D-8BFB-6AC5EAA48FF5}"/>
-              </a:ext>
-            </a:extLst>
-          </p:cNvPr>
-          <p:cNvSpPr txBox="1"/>
-          <p:nvPr/>
-        </p:nvSpPr>
-        <p:spPr>
-          <a:xfrm>
-            <a:off x="838200" y="681037"/>
-            <a:ext cx="8511466" cy="830997"/>
-          </a:xfrm>
-          <a:prstGeom prst="rect">
-            <a:avLst/>
-          </a:prstGeom>
-          <a:noFill/>
-        </p:spPr>
-        <p:txBody>
-          <a:bodyPr wrap="square">
-            <a:spAutoFit/>
-          </a:bodyPr>
-          <a:lstStyle/>
-          <a:p>
-            <a:r>
-              <a:rPr lang="en-US" sz="2400" dirty="0"/>
-              <a:t>Principle 1: A necessary part of a test case is a definition of the expected output or result.</a:t>
-            </a:r>
-          </a:p>
-        </p:txBody>
-      </p:sp>
-      <p:sp>
-        <p:nvSpPr>
-          <p:cNvPr id="7" name="TextBox 6">
-            <a:extLst>
-              <a:ext uri="{FF2B5EF4-FFF2-40B4-BE49-F238E27FC236}">
-                <a16:creationId xmlns:a16="http://schemas.microsoft.com/office/drawing/2014/main" id="{23131054-AA2A-4F34-BFE6-7568D8CD67B8}"/>
-              </a:ext>
-            </a:extLst>
-          </p:cNvPr>
-          <p:cNvSpPr txBox="1"/>
-          <p:nvPr/>
-        </p:nvSpPr>
-        <p:spPr>
-          <a:xfrm>
-            <a:off x="1051264" y="2428017"/>
-            <a:ext cx="8085338" cy="1200329"/>
-          </a:xfrm>
-          <a:prstGeom prst="rect">
-            <a:avLst/>
-          </a:prstGeom>
-          <a:noFill/>
-        </p:spPr>
-        <p:txBody>
-          <a:bodyPr wrap="square">
-            <a:spAutoFit/>
-          </a:bodyPr>
-          <a:lstStyle/>
-          <a:p>
-            <a:r>
-              <a:rPr lang="en-US" sz="2400" dirty="0"/>
-              <a:t>A test case must have </a:t>
-            </a:r>
-          </a:p>
-          <a:p>
-            <a:r>
-              <a:rPr lang="en-US" sz="2400" dirty="0"/>
-              <a:t> 1. input data description</a:t>
-            </a:r>
-          </a:p>
-          <a:p>
-            <a:r>
-              <a:rPr lang="en-US" sz="2400" dirty="0"/>
-              <a:t>2. Correct output  precise description (for that input)</a:t>
-            </a:r>
-          </a:p>
-        </p:txBody>
-      </p:sp>
-      <p:sp>
-        <p:nvSpPr>
-          <p:cNvPr id="9" name="TextBox 8">
-            <a:extLst>
-              <a:ext uri="{FF2B5EF4-FFF2-40B4-BE49-F238E27FC236}">
-                <a16:creationId xmlns:a16="http://schemas.microsoft.com/office/drawing/2014/main" id="{6FC3AFA7-6784-4AB1-9D6A-0E856B4DB734}"/>
-              </a:ext>
-            </a:extLst>
-          </p:cNvPr>
-          <p:cNvSpPr txBox="1"/>
-          <p:nvPr/>
-        </p:nvSpPr>
-        <p:spPr>
-          <a:xfrm>
-            <a:off x="4352277" y="1512034"/>
-            <a:ext cx="6094520" cy="646331"/>
-          </a:xfrm>
-          <a:prstGeom prst="rect">
-            <a:avLst/>
-          </a:prstGeom>
-          <a:solidFill>
-            <a:schemeClr val="accent2">
-              <a:lumMod val="60000"/>
-              <a:lumOff val="40000"/>
-            </a:schemeClr>
-          </a:solidFill>
-        </p:spPr>
-        <p:txBody>
-          <a:bodyPr wrap="square">
-            <a:spAutoFit/>
-          </a:bodyPr>
-          <a:lstStyle/>
-          <a:p>
-            <a:r>
-              <a:rPr lang="en-US" dirty="0"/>
-              <a:t>W/o predefined expected result -&gt; might interpret a plausible, but erroneous result as correct </a:t>
-            </a:r>
-          </a:p>
-        </p:txBody>
-      </p:sp>
-    </p:spTree>
-    <p:extLst>
-      <p:ext uri="{BB962C8B-B14F-4D97-AF65-F5344CB8AC3E}">
-        <p14:creationId xmlns:p14="http://schemas.microsoft.com/office/powerpoint/2010/main" val="3875808325"/>
-      </p:ext>
-    </p:extLst>
-  </p:cSld>
-  <p:clrMapOvr>
-    <a:masterClrMapping/>
-  </p:clrMapOvr>
-</p:sld>
-</file>
-
 <file path=ppt/slides/slide22.xml><?xml version="1.0" encoding="utf-8"?>
 <p:sld xmlns:a="http://schemas.openxmlformats.org/drawingml/2006/main" xmlns:r="http://schemas.openxmlformats.org/officeDocument/2006/relationships" xmlns:p="http://schemas.openxmlformats.org/presentationml/2006/main">
   <p:cSld>
@@ -6618,6 +6799,158 @@
         </p:nvSpPr>
         <p:spPr>
           <a:xfrm>
+            <a:off x="838200" y="681037"/>
+            <a:ext cx="8511466" cy="830997"/>
+          </a:xfrm>
+          <a:prstGeom prst="rect">
+            <a:avLst/>
+          </a:prstGeom>
+          <a:noFill/>
+        </p:spPr>
+        <p:txBody>
+          <a:bodyPr wrap="square">
+            <a:spAutoFit/>
+          </a:bodyPr>
+          <a:lstStyle/>
+          <a:p>
+            <a:r>
+              <a:rPr lang="en-US" sz="2400" dirty="0"/>
+              <a:t>Principle 1: A necessary part of a test case is a definition of the expected output or result.</a:t>
+            </a:r>
+          </a:p>
+        </p:txBody>
+      </p:sp>
+      <p:sp>
+        <p:nvSpPr>
+          <p:cNvPr id="7" name="TextBox 6">
+            <a:extLst>
+              <a:ext uri="{FF2B5EF4-FFF2-40B4-BE49-F238E27FC236}">
+                <a16:creationId xmlns:a16="http://schemas.microsoft.com/office/drawing/2014/main" id="{23131054-AA2A-4F34-BFE6-7568D8CD67B8}"/>
+              </a:ext>
+            </a:extLst>
+          </p:cNvPr>
+          <p:cNvSpPr txBox="1"/>
+          <p:nvPr/>
+        </p:nvSpPr>
+        <p:spPr>
+          <a:xfrm>
+            <a:off x="1051264" y="2428017"/>
+            <a:ext cx="8085338" cy="1200329"/>
+          </a:xfrm>
+          <a:prstGeom prst="rect">
+            <a:avLst/>
+          </a:prstGeom>
+          <a:noFill/>
+        </p:spPr>
+        <p:txBody>
+          <a:bodyPr wrap="square">
+            <a:spAutoFit/>
+          </a:bodyPr>
+          <a:lstStyle/>
+          <a:p>
+            <a:r>
+              <a:rPr lang="en-US" sz="2400" dirty="0"/>
+              <a:t>A test case must have </a:t>
+            </a:r>
+          </a:p>
+          <a:p>
+            <a:r>
+              <a:rPr lang="en-US" sz="2400" dirty="0"/>
+              <a:t> 1. input data description</a:t>
+            </a:r>
+          </a:p>
+          <a:p>
+            <a:r>
+              <a:rPr lang="en-US" sz="2400" dirty="0"/>
+              <a:t>2. Correct output  precise description (for that input)</a:t>
+            </a:r>
+          </a:p>
+        </p:txBody>
+      </p:sp>
+      <p:sp>
+        <p:nvSpPr>
+          <p:cNvPr id="9" name="TextBox 8">
+            <a:extLst>
+              <a:ext uri="{FF2B5EF4-FFF2-40B4-BE49-F238E27FC236}">
+                <a16:creationId xmlns:a16="http://schemas.microsoft.com/office/drawing/2014/main" id="{6FC3AFA7-6784-4AB1-9D6A-0E856B4DB734}"/>
+              </a:ext>
+            </a:extLst>
+          </p:cNvPr>
+          <p:cNvSpPr txBox="1"/>
+          <p:nvPr/>
+        </p:nvSpPr>
+        <p:spPr>
+          <a:xfrm>
+            <a:off x="4352277" y="1512034"/>
+            <a:ext cx="6094520" cy="646331"/>
+          </a:xfrm>
+          <a:prstGeom prst="rect">
+            <a:avLst/>
+          </a:prstGeom>
+          <a:solidFill>
+            <a:schemeClr val="accent2">
+              <a:lumMod val="60000"/>
+              <a:lumOff val="40000"/>
+            </a:schemeClr>
+          </a:solidFill>
+        </p:spPr>
+        <p:txBody>
+          <a:bodyPr wrap="square">
+            <a:spAutoFit/>
+          </a:bodyPr>
+          <a:lstStyle/>
+          <a:p>
+            <a:r>
+              <a:rPr lang="en-US" dirty="0"/>
+              <a:t>W/o predefined expected result -&gt; might interpret a plausible, but erroneous result as correct </a:t>
+            </a:r>
+          </a:p>
+        </p:txBody>
+      </p:sp>
+    </p:spTree>
+    <p:extLst>
+      <p:ext uri="{BB962C8B-B14F-4D97-AF65-F5344CB8AC3E}">
+        <p14:creationId xmlns:p14="http://schemas.microsoft.com/office/powerpoint/2010/main" val="3875808325"/>
+      </p:ext>
+    </p:extLst>
+  </p:cSld>
+  <p:clrMapOvr>
+    <a:masterClrMapping/>
+  </p:clrMapOvr>
+</p:sld>
+</file>
+
+<file path=ppt/slides/slide23.xml><?xml version="1.0" encoding="utf-8"?>
+<p:sld xmlns:a="http://schemas.openxmlformats.org/drawingml/2006/main" xmlns:r="http://schemas.openxmlformats.org/officeDocument/2006/relationships" xmlns:p="http://schemas.openxmlformats.org/presentationml/2006/main">
+  <p:cSld>
+    <p:spTree>
+      <p:nvGrpSpPr>
+        <p:cNvPr id="1" name=""/>
+        <p:cNvGrpSpPr/>
+        <p:nvPr/>
+      </p:nvGrpSpPr>
+      <p:grpSpPr>
+        <a:xfrm>
+          <a:off x="0" y="0"/>
+          <a:ext cx="0" cy="0"/>
+          <a:chOff x="0" y="0"/>
+          <a:chExt cx="0" cy="0"/>
+        </a:xfrm>
+      </p:grpSpPr>
+      <p:sp>
+        <p:nvSpPr>
+          <p:cNvPr id="5" name="TextBox 4">
+            <a:extLst>
+              <a:ext uri="{FF2B5EF4-FFF2-40B4-BE49-F238E27FC236}">
+                <a16:creationId xmlns:a16="http://schemas.microsoft.com/office/drawing/2014/main" id="{ECF59612-2636-483D-8BFB-6AC5EAA48FF5}"/>
+              </a:ext>
+            </a:extLst>
+          </p:cNvPr>
+          <p:cNvSpPr txBox="1"/>
+          <p:nvPr/>
+        </p:nvSpPr>
+        <p:spPr>
+          <a:xfrm>
             <a:off x="119108" y="107088"/>
             <a:ext cx="10542973" cy="461665"/>
           </a:xfrm>
@@ -6869,7 +7202,7 @@
 </p:sld>
 </file>
 
-<file path=ppt/slides/slide23.xml><?xml version="1.0" encoding="utf-8"?>
+<file path=ppt/slides/slide24.xml><?xml version="1.0" encoding="utf-8"?>
 <p:sld xmlns:a="http://schemas.openxmlformats.org/drawingml/2006/main" xmlns:r="http://schemas.openxmlformats.org/officeDocument/2006/relationships" xmlns:p="http://schemas.openxmlformats.org/presentationml/2006/main">
   <p:cSld>
     <p:spTree>
@@ -7035,7 +7368,7 @@
 </p:sld>
 </file>
 
-<file path=ppt/slides/slide24.xml><?xml version="1.0" encoding="utf-8"?>
+<file path=ppt/slides/slide25.xml><?xml version="1.0" encoding="utf-8"?>
 <p:sld xmlns:a="http://schemas.openxmlformats.org/drawingml/2006/main" xmlns:r="http://schemas.openxmlformats.org/officeDocument/2006/relationships" xmlns:p="http://schemas.openxmlformats.org/presentationml/2006/main">
   <p:cSld>
     <p:spTree>
@@ -7339,7 +7672,7 @@
 </p:sld>
 </file>
 
-<file path=ppt/slides/slide25.xml><?xml version="1.0" encoding="utf-8"?>
+<file path=ppt/slides/slide26.xml><?xml version="1.0" encoding="utf-8"?>
 <p:sld xmlns:a="http://schemas.openxmlformats.org/drawingml/2006/main" xmlns:r="http://schemas.openxmlformats.org/officeDocument/2006/relationships" xmlns:p="http://schemas.openxmlformats.org/presentationml/2006/main">
   <p:cSld>
     <p:spTree>
@@ -7646,113 +7979,6 @@
 </p:sld>
 </file>
 
-<file path=ppt/slides/slide26.xml><?xml version="1.0" encoding="utf-8"?>
-<p:sld xmlns:a="http://schemas.openxmlformats.org/drawingml/2006/main" xmlns:r="http://schemas.openxmlformats.org/officeDocument/2006/relationships" xmlns:p="http://schemas.openxmlformats.org/presentationml/2006/main">
-  <p:cSld>
-    <p:spTree>
-      <p:nvGrpSpPr>
-        <p:cNvPr id="1" name=""/>
-        <p:cNvGrpSpPr/>
-        <p:nvPr/>
-      </p:nvGrpSpPr>
-      <p:grpSpPr>
-        <a:xfrm>
-          <a:off x="0" y="0"/>
-          <a:ext cx="0" cy="0"/>
-          <a:chOff x="0" y="0"/>
-          <a:chExt cx="0" cy="0"/>
-        </a:xfrm>
-      </p:grpSpPr>
-      <p:sp>
-        <p:nvSpPr>
-          <p:cNvPr id="2" name="Title 1"/>
-          <p:cNvSpPr>
-            <a:spLocks noGrp="1"/>
-          </p:cNvSpPr>
-          <p:nvPr>
-            <p:ph type="title"/>
-          </p:nvPr>
-        </p:nvSpPr>
-        <p:spPr/>
-        <p:txBody>
-          <a:bodyPr/>
-          <a:lstStyle/>
-          <a:p>
-            <a:r>
-              <a:rPr lang="en-US" dirty="0"/>
-              <a:t>For example … which one do you test first?</a:t>
-            </a:r>
-          </a:p>
-        </p:txBody>
-      </p:sp>
-      <p:pic>
-        <p:nvPicPr>
-          <p:cNvPr id="4" name="Picture 3"/>
-          <p:cNvPicPr>
-            <a:picLocks noChangeAspect="1"/>
-          </p:cNvPicPr>
-          <p:nvPr/>
-        </p:nvPicPr>
-        <p:blipFill>
-          <a:blip r:embed="rId2"/>
-          <a:stretch>
-            <a:fillRect/>
-          </a:stretch>
-        </p:blipFill>
-        <p:spPr>
-          <a:xfrm>
-            <a:off x="2057399" y="1825625"/>
-            <a:ext cx="6734175" cy="2971800"/>
-          </a:xfrm>
-          <a:prstGeom prst="rect">
-            <a:avLst/>
-          </a:prstGeom>
-        </p:spPr>
-      </p:pic>
-      <p:sp>
-        <p:nvSpPr>
-          <p:cNvPr id="3" name="TextBox 2"/>
-          <p:cNvSpPr txBox="1"/>
-          <p:nvPr/>
-        </p:nvSpPr>
-        <p:spPr>
-          <a:xfrm>
-            <a:off x="1906438" y="5555411"/>
-            <a:ext cx="8007641" cy="369332"/>
-          </a:xfrm>
-          <a:prstGeom prst="rect">
-            <a:avLst/>
-          </a:prstGeom>
-          <a:solidFill>
-            <a:srgbClr val="FFFF00"/>
-          </a:solidFill>
-        </p:spPr>
-        <p:txBody>
-          <a:bodyPr wrap="none" rtlCol="0">
-            <a:spAutoFit/>
-          </a:bodyPr>
-          <a:lstStyle/>
-          <a:p>
-            <a:r>
-              <a:rPr lang="en-US" dirty="0"/>
-              <a:t>Question 2: After your exhaustive testing and retesting … is your program bug-free?</a:t>
-            </a:r>
-          </a:p>
-        </p:txBody>
-      </p:sp>
-    </p:spTree>
-    <p:extLst>
-      <p:ext uri="{BB962C8B-B14F-4D97-AF65-F5344CB8AC3E}">
-        <p14:creationId xmlns:p14="http://schemas.microsoft.com/office/powerpoint/2010/main" val="2973791271"/>
-      </p:ext>
-    </p:extLst>
-  </p:cSld>
-  <p:clrMapOvr>
-    <a:masterClrMapping/>
-  </p:clrMapOvr>
-</p:sld>
-</file>
-
 <file path=ppt/slides/slide27.xml><?xml version="1.0" encoding="utf-8"?>
 <p:sld xmlns:a="http://schemas.openxmlformats.org/drawingml/2006/main" xmlns:r="http://schemas.openxmlformats.org/officeDocument/2006/relationships" xmlns:p="http://schemas.openxmlformats.org/presentationml/2006/main">
   <p:cSld>
@@ -7772,47 +7998,29 @@
       </p:grpSpPr>
       <p:sp>
         <p:nvSpPr>
-          <p:cNvPr id="5" name="TextBox 4"/>
-          <p:cNvSpPr txBox="1"/>
-          <p:nvPr/>
-        </p:nvSpPr>
-        <p:spPr>
-          <a:xfrm>
-            <a:off x="2257495" y="1006872"/>
-            <a:ext cx="6868932" cy="523220"/>
-          </a:xfrm>
-          <a:prstGeom prst="rect">
-            <a:avLst/>
-          </a:prstGeom>
-          <a:solidFill>
-            <a:schemeClr val="accent1">
-              <a:lumMod val="60000"/>
-              <a:lumOff val="40000"/>
-            </a:schemeClr>
-          </a:solidFill>
-        </p:spPr>
-        <p:txBody>
-          <a:bodyPr wrap="none" rtlCol="0">
-            <a:spAutoFit/>
-          </a:bodyPr>
-          <a:lstStyle/>
-          <a:p>
-            <a:r>
-              <a:rPr lang="en-US" sz="2800" dirty="0"/>
-              <a:t>Principle 2 – Exhaustive Testing is not possible</a:t>
+          <p:cNvPr id="2" name="Title 1"/>
+          <p:cNvSpPr>
+            <a:spLocks noGrp="1"/>
+          </p:cNvSpPr>
+          <p:nvPr>
+            <p:ph type="title"/>
+          </p:nvPr>
+        </p:nvSpPr>
+        <p:spPr/>
+        <p:txBody>
+          <a:bodyPr/>
+          <a:lstStyle/>
+          <a:p>
+            <a:r>
+              <a:rPr lang="en-US" dirty="0"/>
+              <a:t>For example … which one do you test first?</a:t>
             </a:r>
           </a:p>
         </p:txBody>
       </p:sp>
       <p:pic>
         <p:nvPicPr>
-          <p:cNvPr id="3" name="Picture 2">
-            <a:extLst>
-              <a:ext uri="{FF2B5EF4-FFF2-40B4-BE49-F238E27FC236}">
-                <a16:creationId xmlns:a16="http://schemas.microsoft.com/office/drawing/2014/main" id="{C9A34E58-E922-4232-8DC4-B1A749E98456}"/>
-              </a:ext>
-            </a:extLst>
-          </p:cNvPr>
+          <p:cNvPr id="4" name="Picture 3"/>
           <p:cNvPicPr>
             <a:picLocks noChangeAspect="1"/>
           </p:cNvPicPr>
@@ -7826,18 +8034,49 @@
         </p:blipFill>
         <p:spPr>
           <a:xfrm>
-            <a:off x="2607080" y="1966026"/>
-            <a:ext cx="7313157" cy="4009472"/>
+            <a:off x="2057399" y="1825625"/>
+            <a:ext cx="6734175" cy="2971800"/>
           </a:xfrm>
           <a:prstGeom prst="rect">
             <a:avLst/>
           </a:prstGeom>
         </p:spPr>
       </p:pic>
+      <p:sp>
+        <p:nvSpPr>
+          <p:cNvPr id="3" name="TextBox 2"/>
+          <p:cNvSpPr txBox="1"/>
+          <p:nvPr/>
+        </p:nvSpPr>
+        <p:spPr>
+          <a:xfrm>
+            <a:off x="1906438" y="5555411"/>
+            <a:ext cx="8007641" cy="369332"/>
+          </a:xfrm>
+          <a:prstGeom prst="rect">
+            <a:avLst/>
+          </a:prstGeom>
+          <a:solidFill>
+            <a:srgbClr val="FFFF00"/>
+          </a:solidFill>
+        </p:spPr>
+        <p:txBody>
+          <a:bodyPr wrap="none" rtlCol="0">
+            <a:spAutoFit/>
+          </a:bodyPr>
+          <a:lstStyle/>
+          <a:p>
+            <a:r>
+              <a:rPr lang="en-US" dirty="0"/>
+              <a:t>Question 2: After your exhaustive testing and retesting … is your program bug-free?</a:t>
+            </a:r>
+          </a:p>
+        </p:txBody>
+      </p:sp>
     </p:spTree>
     <p:extLst>
       <p:ext uri="{BB962C8B-B14F-4D97-AF65-F5344CB8AC3E}">
-        <p14:creationId xmlns:p14="http://schemas.microsoft.com/office/powerpoint/2010/main" val="139729463"/>
+        <p14:creationId xmlns:p14="http://schemas.microsoft.com/office/powerpoint/2010/main" val="2973791271"/>
       </p:ext>
     </p:extLst>
   </p:cSld>
@@ -7872,8 +8111,8 @@
         </p:nvSpPr>
         <p:spPr>
           <a:xfrm>
-            <a:off x="4138846" y="336456"/>
-            <a:ext cx="6477799" cy="523220"/>
+            <a:off x="2257495" y="1006872"/>
+            <a:ext cx="6868932" cy="523220"/>
           </a:xfrm>
           <a:prstGeom prst="rect">
             <a:avLst/>
@@ -7893,47 +8132,7 @@
           <a:p>
             <a:r>
               <a:rPr lang="en-US" sz="2800" dirty="0"/>
-              <a:t>Principle  3 Early Testing as soon a possible </a:t>
-            </a:r>
-          </a:p>
-        </p:txBody>
-      </p:sp>
-      <p:sp>
-        <p:nvSpPr>
-          <p:cNvPr id="7" name="TextBox 6"/>
-          <p:cNvSpPr txBox="1"/>
-          <p:nvPr/>
-        </p:nvSpPr>
-        <p:spPr>
-          <a:xfrm>
-            <a:off x="657226" y="4850695"/>
-            <a:ext cx="7112203" cy="830997"/>
-          </a:xfrm>
-          <a:prstGeom prst="rect">
-            <a:avLst/>
-          </a:prstGeom>
-          <a:solidFill>
-            <a:schemeClr val="accent1">
-              <a:lumMod val="60000"/>
-              <a:lumOff val="40000"/>
-            </a:schemeClr>
-          </a:solidFill>
-        </p:spPr>
-        <p:txBody>
-          <a:bodyPr wrap="none" rtlCol="0">
-            <a:spAutoFit/>
-          </a:bodyPr>
-          <a:lstStyle/>
-          <a:p>
-            <a:r>
-              <a:rPr lang="en-US" sz="2400" dirty="0"/>
-              <a:t>Want to detect defects as soon as possible … </a:t>
-            </a:r>
-          </a:p>
-          <a:p>
-            <a:r>
-              <a:rPr lang="en-US" sz="2400" dirty="0"/>
-              <a:t>                         once in the field … can be super expensive</a:t>
+              <a:t>Principle 2 – Exhaustive Testing is not possible</a:t>
             </a:r>
           </a:p>
         </p:txBody>
@@ -7943,7 +8142,7 @@
           <p:cNvPr id="3" name="Picture 2">
             <a:extLst>
               <a:ext uri="{FF2B5EF4-FFF2-40B4-BE49-F238E27FC236}">
-                <a16:creationId xmlns:a16="http://schemas.microsoft.com/office/drawing/2014/main" id="{E62E4BB4-1BEF-48D5-AA49-4ED94C4889E6}"/>
+                <a16:creationId xmlns:a16="http://schemas.microsoft.com/office/drawing/2014/main" id="{C9A34E58-E922-4232-8DC4-B1A749E98456}"/>
               </a:ext>
             </a:extLst>
           </p:cNvPr>
@@ -7960,8 +8159,8 @@
         </p:blipFill>
         <p:spPr>
           <a:xfrm>
-            <a:off x="1132629" y="1221648"/>
-            <a:ext cx="5695950" cy="3267075"/>
+            <a:off x="2607080" y="1966026"/>
+            <a:ext cx="7313157" cy="4009472"/>
           </a:xfrm>
           <a:prstGeom prst="rect">
             <a:avLst/>
@@ -7971,7 +8170,7 @@
     </p:spTree>
     <p:extLst>
       <p:ext uri="{BB962C8B-B14F-4D97-AF65-F5344CB8AC3E}">
-        <p14:creationId xmlns:p14="http://schemas.microsoft.com/office/powerpoint/2010/main" val="2332817797"/>
+        <p14:creationId xmlns:p14="http://schemas.microsoft.com/office/powerpoint/2010/main" val="139729463"/>
       </p:ext>
     </p:extLst>
   </p:cSld>
@@ -7998,9 +8197,89 @@
           <a:chExt cx="0" cy="0"/>
         </a:xfrm>
       </p:grpSpPr>
+      <p:sp>
+        <p:nvSpPr>
+          <p:cNvPr id="5" name="TextBox 4"/>
+          <p:cNvSpPr txBox="1"/>
+          <p:nvPr/>
+        </p:nvSpPr>
+        <p:spPr>
+          <a:xfrm>
+            <a:off x="4138846" y="336456"/>
+            <a:ext cx="6477799" cy="523220"/>
+          </a:xfrm>
+          <a:prstGeom prst="rect">
+            <a:avLst/>
+          </a:prstGeom>
+          <a:solidFill>
+            <a:schemeClr val="accent1">
+              <a:lumMod val="60000"/>
+              <a:lumOff val="40000"/>
+            </a:schemeClr>
+          </a:solidFill>
+        </p:spPr>
+        <p:txBody>
+          <a:bodyPr wrap="none" rtlCol="0">
+            <a:spAutoFit/>
+          </a:bodyPr>
+          <a:lstStyle/>
+          <a:p>
+            <a:r>
+              <a:rPr lang="en-US" sz="2800" dirty="0"/>
+              <a:t>Principle  3 Early Testing as soon a possible </a:t>
+            </a:r>
+          </a:p>
+        </p:txBody>
+      </p:sp>
+      <p:sp>
+        <p:nvSpPr>
+          <p:cNvPr id="7" name="TextBox 6"/>
+          <p:cNvSpPr txBox="1"/>
+          <p:nvPr/>
+        </p:nvSpPr>
+        <p:spPr>
+          <a:xfrm>
+            <a:off x="657226" y="4850695"/>
+            <a:ext cx="7112203" cy="830997"/>
+          </a:xfrm>
+          <a:prstGeom prst="rect">
+            <a:avLst/>
+          </a:prstGeom>
+          <a:solidFill>
+            <a:schemeClr val="accent1">
+              <a:lumMod val="60000"/>
+              <a:lumOff val="40000"/>
+            </a:schemeClr>
+          </a:solidFill>
+        </p:spPr>
+        <p:txBody>
+          <a:bodyPr wrap="none" rtlCol="0">
+            <a:spAutoFit/>
+          </a:bodyPr>
+          <a:lstStyle/>
+          <a:p>
+            <a:r>
+              <a:rPr lang="en-US" sz="2400" dirty="0"/>
+              <a:t>Want to detect defects as soon as possible … </a:t>
+            </a:r>
+          </a:p>
+          <a:p>
+            <a:r>
+              <a:rPr lang="en-US" sz="2400" dirty="0"/>
+              <a:t>                         once in the field … can be super expensive</a:t>
+            </a:r>
+          </a:p>
+        </p:txBody>
+      </p:sp>
       <p:pic>
         <p:nvPicPr>
-          <p:cNvPr id="5" name="Picture 4"/>
+          <p:cNvPr id="3" name="Picture 2">
+            <a:extLst>
+              <a:ext uri="{FF2B5EF4-FFF2-40B4-BE49-F238E27FC236}">
+                <a16:creationId xmlns:a16="http://schemas.microsoft.com/office/drawing/2014/main" id="{E62E4BB4-1BEF-48D5-AA49-4ED94C4889E6}"/>
+              </a:ext>
+            </a:extLst>
+          </p:cNvPr>
           <p:cNvPicPr>
             <a:picLocks noChangeAspect="1"/>
           </p:cNvPicPr>
@@ -8014,159 +8293,18 @@
         </p:blipFill>
         <p:spPr>
           <a:xfrm>
-            <a:off x="7223464" y="250793"/>
-            <a:ext cx="4200525" cy="2771775"/>
+            <a:off x="1132629" y="1221648"/>
+            <a:ext cx="5695950" cy="3267075"/>
           </a:xfrm>
           <a:prstGeom prst="rect">
             <a:avLst/>
           </a:prstGeom>
         </p:spPr>
       </p:pic>
-      <p:sp>
-        <p:nvSpPr>
-          <p:cNvPr id="9" name="TextBox 8"/>
-          <p:cNvSpPr txBox="1"/>
-          <p:nvPr/>
-        </p:nvSpPr>
-        <p:spPr>
-          <a:xfrm>
-            <a:off x="2110020" y="103515"/>
-            <a:ext cx="4542526" cy="523220"/>
-          </a:xfrm>
-          <a:prstGeom prst="rect">
-            <a:avLst/>
-          </a:prstGeom>
-          <a:solidFill>
-            <a:schemeClr val="accent1">
-              <a:lumMod val="60000"/>
-              <a:lumOff val="40000"/>
-            </a:schemeClr>
-          </a:solidFill>
-        </p:spPr>
-        <p:txBody>
-          <a:bodyPr wrap="none" rtlCol="0">
-            <a:spAutoFit/>
-          </a:bodyPr>
-          <a:lstStyle/>
-          <a:p>
-            <a:r>
-              <a:rPr lang="en-US" sz="2800" dirty="0"/>
-              <a:t>Principle 4 – Defect Clustering</a:t>
-            </a:r>
-          </a:p>
-        </p:txBody>
-      </p:sp>
-      <p:sp>
-        <p:nvSpPr>
-          <p:cNvPr id="12" name="TextBox 11">
-            <a:extLst>
-              <a:ext uri="{FF2B5EF4-FFF2-40B4-BE49-F238E27FC236}">
-                <a16:creationId xmlns:a16="http://schemas.microsoft.com/office/drawing/2014/main" id="{1B7C81ED-6407-4F16-BBDA-3EAACF489C27}"/>
-              </a:ext>
-            </a:extLst>
-          </p:cNvPr>
-          <p:cNvSpPr txBox="1"/>
-          <p:nvPr/>
-        </p:nvSpPr>
-        <p:spPr>
-          <a:xfrm>
-            <a:off x="1480" y="811401"/>
-            <a:ext cx="6094520" cy="923330"/>
-          </a:xfrm>
-          <a:prstGeom prst="rect">
-            <a:avLst/>
-          </a:prstGeom>
-          <a:solidFill>
-            <a:srgbClr val="FFFF00"/>
-          </a:solidFill>
-        </p:spPr>
-        <p:txBody>
-          <a:bodyPr wrap="square">
-            <a:spAutoFit/>
-          </a:bodyPr>
-          <a:lstStyle/>
-          <a:p>
-            <a:r>
-              <a:rPr lang="en-US" dirty="0"/>
-              <a:t>The probability of the existence of more errors in a section of a program is proportional to the number of errors already found in that section</a:t>
-            </a:r>
-          </a:p>
-        </p:txBody>
-      </p:sp>
-      <p:pic>
-        <p:nvPicPr>
-          <p:cNvPr id="13" name="Picture 12">
-            <a:extLst>
-              <a:ext uri="{FF2B5EF4-FFF2-40B4-BE49-F238E27FC236}">
-                <a16:creationId xmlns:a16="http://schemas.microsoft.com/office/drawing/2014/main" id="{BFC2AC5E-451B-430D-A394-3A515BBDD576}"/>
-              </a:ext>
-            </a:extLst>
-          </p:cNvPr>
-          <p:cNvPicPr>
-            <a:picLocks noChangeAspect="1"/>
-          </p:cNvPicPr>
-          <p:nvPr/>
-        </p:nvPicPr>
-        <p:blipFill>
-          <a:blip r:embed="rId3"/>
-          <a:stretch>
-            <a:fillRect/>
-          </a:stretch>
-        </p:blipFill>
-        <p:spPr>
-          <a:xfrm>
-            <a:off x="1551895" y="2921308"/>
-            <a:ext cx="6455764" cy="3498608"/>
-          </a:xfrm>
-          <a:prstGeom prst="rect">
-            <a:avLst/>
-          </a:prstGeom>
-        </p:spPr>
-      </p:pic>
-      <p:sp>
-        <p:nvSpPr>
-          <p:cNvPr id="15" name="TextBox 14">
-            <a:extLst>
-              <a:ext uri="{FF2B5EF4-FFF2-40B4-BE49-F238E27FC236}">
-                <a16:creationId xmlns:a16="http://schemas.microsoft.com/office/drawing/2014/main" id="{E11CA594-12E7-4B7C-B8D0-42041623FA41}"/>
-              </a:ext>
-            </a:extLst>
-          </p:cNvPr>
-          <p:cNvSpPr txBox="1"/>
-          <p:nvPr/>
-        </p:nvSpPr>
-        <p:spPr>
-          <a:xfrm>
-            <a:off x="275208" y="2274977"/>
-            <a:ext cx="6175991" cy="646331"/>
-          </a:xfrm>
-          <a:prstGeom prst="rect">
-            <a:avLst/>
-          </a:prstGeom>
-          <a:solidFill>
-            <a:schemeClr val="accent5">
-              <a:lumMod val="40000"/>
-              <a:lumOff val="60000"/>
-            </a:schemeClr>
-          </a:solidFill>
-        </p:spPr>
-        <p:txBody>
-          <a:bodyPr wrap="square">
-            <a:spAutoFit/>
-          </a:bodyPr>
-          <a:lstStyle/>
-          <a:p>
-            <a:r>
-              <a:rPr lang="en-US" dirty="0"/>
-              <a:t>some sections seem to be much more prone to errors than other section</a:t>
-            </a:r>
-          </a:p>
-        </p:txBody>
-      </p:sp>
     </p:spTree>
     <p:extLst>
       <p:ext uri="{BB962C8B-B14F-4D97-AF65-F5344CB8AC3E}">
-        <p14:creationId xmlns:p14="http://schemas.microsoft.com/office/powerpoint/2010/main" val="1375167293"/>
+        <p14:creationId xmlns:p14="http://schemas.microsoft.com/office/powerpoint/2010/main" val="2332817797"/>
       </p:ext>
     </p:extLst>
   </p:cSld>
@@ -8338,6 +8476,201 @@
       </p:grpSpPr>
       <p:pic>
         <p:nvPicPr>
+          <p:cNvPr id="5" name="Picture 4"/>
+          <p:cNvPicPr>
+            <a:picLocks noChangeAspect="1"/>
+          </p:cNvPicPr>
+          <p:nvPr/>
+        </p:nvPicPr>
+        <p:blipFill>
+          <a:blip r:embed="rId2"/>
+          <a:stretch>
+            <a:fillRect/>
+          </a:stretch>
+        </p:blipFill>
+        <p:spPr>
+          <a:xfrm>
+            <a:off x="7223464" y="250793"/>
+            <a:ext cx="4200525" cy="2771775"/>
+          </a:xfrm>
+          <a:prstGeom prst="rect">
+            <a:avLst/>
+          </a:prstGeom>
+        </p:spPr>
+      </p:pic>
+      <p:sp>
+        <p:nvSpPr>
+          <p:cNvPr id="9" name="TextBox 8"/>
+          <p:cNvSpPr txBox="1"/>
+          <p:nvPr/>
+        </p:nvSpPr>
+        <p:spPr>
+          <a:xfrm>
+            <a:off x="2110020" y="103515"/>
+            <a:ext cx="4542526" cy="523220"/>
+          </a:xfrm>
+          <a:prstGeom prst="rect">
+            <a:avLst/>
+          </a:prstGeom>
+          <a:solidFill>
+            <a:schemeClr val="accent1">
+              <a:lumMod val="60000"/>
+              <a:lumOff val="40000"/>
+            </a:schemeClr>
+          </a:solidFill>
+        </p:spPr>
+        <p:txBody>
+          <a:bodyPr wrap="none" rtlCol="0">
+            <a:spAutoFit/>
+          </a:bodyPr>
+          <a:lstStyle/>
+          <a:p>
+            <a:r>
+              <a:rPr lang="en-US" sz="2800" dirty="0"/>
+              <a:t>Principle 4 – Defect Clustering</a:t>
+            </a:r>
+          </a:p>
+        </p:txBody>
+      </p:sp>
+      <p:sp>
+        <p:nvSpPr>
+          <p:cNvPr id="12" name="TextBox 11">
+            <a:extLst>
+              <a:ext uri="{FF2B5EF4-FFF2-40B4-BE49-F238E27FC236}">
+                <a16:creationId xmlns:a16="http://schemas.microsoft.com/office/drawing/2014/main" id="{1B7C81ED-6407-4F16-BBDA-3EAACF489C27}"/>
+              </a:ext>
+            </a:extLst>
+          </p:cNvPr>
+          <p:cNvSpPr txBox="1"/>
+          <p:nvPr/>
+        </p:nvSpPr>
+        <p:spPr>
+          <a:xfrm>
+            <a:off x="1480" y="811401"/>
+            <a:ext cx="6094520" cy="923330"/>
+          </a:xfrm>
+          <a:prstGeom prst="rect">
+            <a:avLst/>
+          </a:prstGeom>
+          <a:solidFill>
+            <a:srgbClr val="FFFF00"/>
+          </a:solidFill>
+        </p:spPr>
+        <p:txBody>
+          <a:bodyPr wrap="square">
+            <a:spAutoFit/>
+          </a:bodyPr>
+          <a:lstStyle/>
+          <a:p>
+            <a:r>
+              <a:rPr lang="en-US" dirty="0"/>
+              <a:t>The probability of the existence of more errors in a section of a program is proportional to the number of errors already found in that section</a:t>
+            </a:r>
+          </a:p>
+        </p:txBody>
+      </p:sp>
+      <p:pic>
+        <p:nvPicPr>
+          <p:cNvPr id="13" name="Picture 12">
+            <a:extLst>
+              <a:ext uri="{FF2B5EF4-FFF2-40B4-BE49-F238E27FC236}">
+                <a16:creationId xmlns:a16="http://schemas.microsoft.com/office/drawing/2014/main" id="{BFC2AC5E-451B-430D-A394-3A515BBDD576}"/>
+              </a:ext>
+            </a:extLst>
+          </p:cNvPr>
+          <p:cNvPicPr>
+            <a:picLocks noChangeAspect="1"/>
+          </p:cNvPicPr>
+          <p:nvPr/>
+        </p:nvPicPr>
+        <p:blipFill>
+          <a:blip r:embed="rId3"/>
+          <a:stretch>
+            <a:fillRect/>
+          </a:stretch>
+        </p:blipFill>
+        <p:spPr>
+          <a:xfrm>
+            <a:off x="1551895" y="2921308"/>
+            <a:ext cx="6455764" cy="3498608"/>
+          </a:xfrm>
+          <a:prstGeom prst="rect">
+            <a:avLst/>
+          </a:prstGeom>
+        </p:spPr>
+      </p:pic>
+      <p:sp>
+        <p:nvSpPr>
+          <p:cNvPr id="15" name="TextBox 14">
+            <a:extLst>
+              <a:ext uri="{FF2B5EF4-FFF2-40B4-BE49-F238E27FC236}">
+                <a16:creationId xmlns:a16="http://schemas.microsoft.com/office/drawing/2014/main" id="{E11CA594-12E7-4B7C-B8D0-42041623FA41}"/>
+              </a:ext>
+            </a:extLst>
+          </p:cNvPr>
+          <p:cNvSpPr txBox="1"/>
+          <p:nvPr/>
+        </p:nvSpPr>
+        <p:spPr>
+          <a:xfrm>
+            <a:off x="275208" y="2274977"/>
+            <a:ext cx="6175991" cy="646331"/>
+          </a:xfrm>
+          <a:prstGeom prst="rect">
+            <a:avLst/>
+          </a:prstGeom>
+          <a:solidFill>
+            <a:schemeClr val="accent5">
+              <a:lumMod val="40000"/>
+              <a:lumOff val="60000"/>
+            </a:schemeClr>
+          </a:solidFill>
+        </p:spPr>
+        <p:txBody>
+          <a:bodyPr wrap="square">
+            <a:spAutoFit/>
+          </a:bodyPr>
+          <a:lstStyle/>
+          <a:p>
+            <a:r>
+              <a:rPr lang="en-US" dirty="0"/>
+              <a:t>some sections seem to be much more prone to errors than other section</a:t>
+            </a:r>
+          </a:p>
+        </p:txBody>
+      </p:sp>
+    </p:spTree>
+    <p:extLst>
+      <p:ext uri="{BB962C8B-B14F-4D97-AF65-F5344CB8AC3E}">
+        <p14:creationId xmlns:p14="http://schemas.microsoft.com/office/powerpoint/2010/main" val="1375167293"/>
+      </p:ext>
+    </p:extLst>
+  </p:cSld>
+  <p:clrMapOvr>
+    <a:masterClrMapping/>
+  </p:clrMapOvr>
+</p:sld>
+</file>
+
+<file path=ppt/slides/slide31.xml><?xml version="1.0" encoding="utf-8"?>
+<p:sld xmlns:a="http://schemas.openxmlformats.org/drawingml/2006/main" xmlns:r="http://schemas.openxmlformats.org/officeDocument/2006/relationships" xmlns:p="http://schemas.openxmlformats.org/presentationml/2006/main">
+  <p:cSld>
+    <p:spTree>
+      <p:nvGrpSpPr>
+        <p:cNvPr id="1" name=""/>
+        <p:cNvGrpSpPr/>
+        <p:nvPr/>
+      </p:nvGrpSpPr>
+      <p:grpSpPr>
+        <a:xfrm>
+          <a:off x="0" y="0"/>
+          <a:ext cx="0" cy="0"/>
+          <a:chOff x="0" y="0"/>
+          <a:chExt cx="0" cy="0"/>
+        </a:xfrm>
+      </p:grpSpPr>
+      <p:pic>
+        <p:nvPicPr>
           <p:cNvPr id="6" name="Picture 5"/>
           <p:cNvPicPr>
             <a:picLocks noChangeAspect="1"/>
@@ -8573,7 +8906,7 @@
 </p:sld>
 </file>
 
-<file path=ppt/slides/slide31.xml><?xml version="1.0" encoding="utf-8"?>
+<file path=ppt/slides/slide32.xml><?xml version="1.0" encoding="utf-8"?>
 <p:sld xmlns:a="http://schemas.openxmlformats.org/drawingml/2006/main" xmlns:r="http://schemas.openxmlformats.org/officeDocument/2006/relationships" xmlns:p="http://schemas.openxmlformats.org/presentationml/2006/main">
   <p:cSld>
     <p:spTree>
@@ -8791,7 +9124,7 @@
 </p:sld>
 </file>
 
-<file path=ppt/slides/slide32.xml><?xml version="1.0" encoding="utf-8"?>
+<file path=ppt/slides/slide33.xml><?xml version="1.0" encoding="utf-8"?>
 <p:sld xmlns:a="http://schemas.openxmlformats.org/drawingml/2006/main" xmlns:r="http://schemas.openxmlformats.org/officeDocument/2006/relationships" xmlns:p="http://schemas.openxmlformats.org/presentationml/2006/main">
   <p:cSld>
     <p:spTree>
@@ -8967,7 +9300,7 @@
 </p:sld>
 </file>
 
-<file path=ppt/slides/slide33.xml><?xml version="1.0" encoding="utf-8"?>
+<file path=ppt/slides/slide34.xml><?xml version="1.0" encoding="utf-8"?>
 <p:sld xmlns:a="http://schemas.openxmlformats.org/drawingml/2006/main" xmlns:r="http://schemas.openxmlformats.org/officeDocument/2006/relationships" xmlns:p="http://schemas.openxmlformats.org/presentationml/2006/main">
   <p:cSld>
     <p:spTree>
@@ -9066,7 +9399,7 @@
 </p:sld>
 </file>
 
-<file path=ppt/slides/slide34.xml><?xml version="1.0" encoding="utf-8"?>
+<file path=ppt/slides/slide35.xml><?xml version="1.0" encoding="utf-8"?>
 <p:sld xmlns:a="http://schemas.openxmlformats.org/drawingml/2006/main" xmlns:r="http://schemas.openxmlformats.org/officeDocument/2006/relationships" xmlns:p="http://schemas.openxmlformats.org/presentationml/2006/main">
   <p:cSld>
     <p:spTree>
@@ -9407,45 +9740,9 @@
           <a:chExt cx="0" cy="0"/>
         </a:xfrm>
       </p:grpSpPr>
-      <p:pic>
-        <p:nvPicPr>
-          <p:cNvPr id="15" name="Picture 14">
-            <a:extLst>
-              <a:ext uri="{FF2B5EF4-FFF2-40B4-BE49-F238E27FC236}">
-                <a16:creationId xmlns:a16="http://schemas.microsoft.com/office/drawing/2014/main" id="{563CBF10-1467-49E5-980E-5AE37607E08C}"/>
-              </a:ext>
-            </a:extLst>
-          </p:cNvPr>
-          <p:cNvPicPr>
-            <a:picLocks noChangeAspect="1"/>
-          </p:cNvPicPr>
-          <p:nvPr/>
-        </p:nvPicPr>
-        <p:blipFill>
-          <a:blip r:embed="rId2"/>
-          <a:stretch>
-            <a:fillRect/>
-          </a:stretch>
-        </p:blipFill>
-        <p:spPr>
-          <a:xfrm>
-            <a:off x="3795110" y="1300024"/>
-            <a:ext cx="3457575" cy="4914900"/>
-          </a:xfrm>
-          <a:prstGeom prst="rect">
-            <a:avLst/>
-          </a:prstGeom>
-        </p:spPr>
-      </p:pic>
-      <p:sp>
-        <p:nvSpPr>
-          <p:cNvPr id="2" name="Title 1">
-            <a:extLst>
-              <a:ext uri="{FF2B5EF4-FFF2-40B4-BE49-F238E27FC236}">
-                <a16:creationId xmlns:a16="http://schemas.microsoft.com/office/drawing/2014/main" id="{5304E31E-684D-4C28-92EE-AD4DE1AC6E93}"/>
-              </a:ext>
-            </a:extLst>
-          </p:cNvPr>
+      <p:sp>
+        <p:nvSpPr>
+          <p:cNvPr id="2" name="Title 1"/>
           <p:cNvSpPr>
             <a:spLocks noGrp="1"/>
           </p:cNvSpPr>
@@ -9459,28 +9756,23 @@
           <a:lstStyle/>
           <a:p>
             <a:r>
-              <a:rPr lang="en-US" dirty="0"/>
-              <a:t>This course and its influences  </a:t>
-            </a:r>
-          </a:p>
-        </p:txBody>
-      </p:sp>
-      <p:sp>
-        <p:nvSpPr>
-          <p:cNvPr id="9" name="TextBox 8">
-            <a:extLst>
-              <a:ext uri="{FF2B5EF4-FFF2-40B4-BE49-F238E27FC236}">
-                <a16:creationId xmlns:a16="http://schemas.microsoft.com/office/drawing/2014/main" id="{79E0F233-D552-4E56-AD1A-1B9122960921}"/>
-              </a:ext>
-            </a:extLst>
-          </p:cNvPr>
-          <p:cNvSpPr txBox="1"/>
+              <a:rPr lang="en-US" dirty="0" smtClean="0"/>
+              <a:t>Do this now … search: “Testing </a:t>
+            </a:r>
+            <a:endParaRPr lang="en-US" dirty="0"/>
+          </a:p>
+        </p:txBody>
+      </p:sp>
+      <p:sp>
+        <p:nvSpPr>
+          <p:cNvPr id="4" name="Rectangle 3"/>
+          <p:cNvSpPr/>
           <p:nvPr/>
         </p:nvSpPr>
         <p:spPr>
           <a:xfrm>
-            <a:off x="1025066" y="3125067"/>
-            <a:ext cx="2502160" cy="369332"/>
+            <a:off x="2004391" y="2100412"/>
+            <a:ext cx="6096000" cy="1881925"/>
           </a:xfrm>
           <a:prstGeom prst="rect">
             <a:avLst/>
@@ -9490,383 +9782,88 @@
           </a:solidFill>
         </p:spPr>
         <p:txBody>
-          <a:bodyPr wrap="none" rtlCol="0">
+          <a:bodyPr>
             <a:spAutoFit/>
           </a:bodyPr>
           <a:lstStyle/>
           <a:p>
-            <a:r>
-              <a:rPr lang="en-US" dirty="0"/>
-              <a:t>CSC3700 – Adv Web App</a:t>
-            </a:r>
-          </a:p>
-        </p:txBody>
-      </p:sp>
-      <p:cxnSp>
-        <p:nvCxnSpPr>
-          <p:cNvPr id="10" name="Straight Arrow Connector 9">
-            <a:extLst>
-              <a:ext uri="{FF2B5EF4-FFF2-40B4-BE49-F238E27FC236}">
-                <a16:creationId xmlns:a16="http://schemas.microsoft.com/office/drawing/2014/main" id="{03CBE362-7612-4346-8CD2-7DD80005B497}"/>
-              </a:ext>
-            </a:extLst>
-          </p:cNvPr>
-          <p:cNvCxnSpPr>
-            <a:cxnSpLocks/>
-            <a:stCxn id="9" idx="2"/>
-          </p:cNvCxnSpPr>
-          <p:nvPr/>
-        </p:nvCxnSpPr>
-        <p:spPr>
-          <a:xfrm>
-            <a:off x="2276146" y="3494399"/>
-            <a:ext cx="1570044" cy="459523"/>
-          </a:xfrm>
-          <a:prstGeom prst="straightConnector1">
-            <a:avLst/>
-          </a:prstGeom>
-          <a:ln>
-            <a:tailEnd type="triangle"/>
-          </a:ln>
-        </p:spPr>
-        <p:style>
-          <a:lnRef idx="1">
-            <a:schemeClr val="accent1"/>
-          </a:lnRef>
-          <a:fillRef idx="0">
-            <a:schemeClr val="accent1"/>
-          </a:fillRef>
-          <a:effectRef idx="0">
-            <a:schemeClr val="accent1"/>
-          </a:effectRef>
-          <a:fontRef idx="minor">
-            <a:schemeClr val="tx1"/>
-          </a:fontRef>
-        </p:style>
-      </p:cxnSp>
-      <p:sp>
-        <p:nvSpPr>
-          <p:cNvPr id="12" name="TextBox 11">
-            <a:extLst>
-              <a:ext uri="{FF2B5EF4-FFF2-40B4-BE49-F238E27FC236}">
-                <a16:creationId xmlns:a16="http://schemas.microsoft.com/office/drawing/2014/main" id="{CA2D991B-B3D6-49B2-99D3-C3AF7E1A527E}"/>
-              </a:ext>
-            </a:extLst>
-          </p:cNvPr>
-          <p:cNvSpPr txBox="1"/>
-          <p:nvPr/>
-        </p:nvSpPr>
-        <p:spPr>
-          <a:xfrm>
-            <a:off x="7571649" y="3688942"/>
-            <a:ext cx="1417376" cy="369332"/>
-          </a:xfrm>
-          <a:prstGeom prst="rect">
-            <a:avLst/>
-          </a:prstGeom>
-          <a:solidFill>
-            <a:srgbClr val="FFFF00"/>
-          </a:solidFill>
-        </p:spPr>
-        <p:txBody>
-          <a:bodyPr wrap="none" rtlCol="0">
-            <a:spAutoFit/>
-          </a:bodyPr>
-          <a:lstStyle/>
-          <a:p>
-            <a:r>
-              <a:rPr lang="en-US" dirty="0"/>
-              <a:t>CSC4350 (SE)</a:t>
-            </a:r>
-          </a:p>
-        </p:txBody>
-      </p:sp>
-      <p:cxnSp>
-        <p:nvCxnSpPr>
-          <p:cNvPr id="13" name="Straight Arrow Connector 12">
-            <a:extLst>
-              <a:ext uri="{FF2B5EF4-FFF2-40B4-BE49-F238E27FC236}">
-                <a16:creationId xmlns:a16="http://schemas.microsoft.com/office/drawing/2014/main" id="{A4872BB4-6C63-419C-B0C1-0889ECE2D3F3}"/>
-              </a:ext>
-            </a:extLst>
-          </p:cNvPr>
-          <p:cNvCxnSpPr>
-            <a:stCxn id="12" idx="1"/>
-          </p:cNvCxnSpPr>
-          <p:nvPr/>
-        </p:nvCxnSpPr>
-        <p:spPr>
-          <a:xfrm flipH="1">
-            <a:off x="6559595" y="3873608"/>
-            <a:ext cx="1012054" cy="809633"/>
-          </a:xfrm>
-          <a:prstGeom prst="straightConnector1">
-            <a:avLst/>
-          </a:prstGeom>
-          <a:ln>
-            <a:tailEnd type="triangle"/>
-          </a:ln>
-        </p:spPr>
-        <p:style>
-          <a:lnRef idx="1">
-            <a:schemeClr val="accent1"/>
-          </a:lnRef>
-          <a:fillRef idx="0">
-            <a:schemeClr val="accent1"/>
-          </a:fillRef>
-          <a:effectRef idx="0">
-            <a:schemeClr val="accent1"/>
-          </a:effectRef>
-          <a:fontRef idx="minor">
-            <a:schemeClr val="tx1"/>
-          </a:fontRef>
-        </p:style>
-      </p:cxnSp>
-      <p:sp>
-        <p:nvSpPr>
-          <p:cNvPr id="16" name="TextBox 15">
-            <a:extLst>
-              <a:ext uri="{FF2B5EF4-FFF2-40B4-BE49-F238E27FC236}">
-                <a16:creationId xmlns:a16="http://schemas.microsoft.com/office/drawing/2014/main" id="{AE11BA26-1568-4F25-A73C-F136D54492A3}"/>
-              </a:ext>
-            </a:extLst>
-          </p:cNvPr>
-          <p:cNvSpPr txBox="1"/>
-          <p:nvPr/>
-        </p:nvSpPr>
-        <p:spPr>
-          <a:xfrm>
-            <a:off x="8375999" y="984787"/>
-            <a:ext cx="2903359" cy="369332"/>
-          </a:xfrm>
-          <a:prstGeom prst="rect">
-            <a:avLst/>
-          </a:prstGeom>
-          <a:solidFill>
-            <a:srgbClr val="FFFF00"/>
-          </a:solidFill>
-        </p:spPr>
-        <p:txBody>
-          <a:bodyPr wrap="none" rtlCol="0">
-            <a:spAutoFit/>
-          </a:bodyPr>
-          <a:lstStyle/>
-          <a:p>
-            <a:r>
-              <a:rPr lang="en-US" dirty="0"/>
-              <a:t>CSC1700 and CSC2660 (OOP)</a:t>
-            </a:r>
-          </a:p>
-        </p:txBody>
-      </p:sp>
-      <p:cxnSp>
-        <p:nvCxnSpPr>
-          <p:cNvPr id="17" name="Straight Arrow Connector 16">
-            <a:extLst>
-              <a:ext uri="{FF2B5EF4-FFF2-40B4-BE49-F238E27FC236}">
-                <a16:creationId xmlns:a16="http://schemas.microsoft.com/office/drawing/2014/main" id="{C3D09767-EBB8-40E6-AC76-145E1936170F}"/>
-              </a:ext>
-            </a:extLst>
-          </p:cNvPr>
-          <p:cNvCxnSpPr>
-            <a:cxnSpLocks/>
-            <a:stCxn id="16" idx="1"/>
-          </p:cNvCxnSpPr>
-          <p:nvPr/>
-        </p:nvCxnSpPr>
-        <p:spPr>
-          <a:xfrm flipH="1">
-            <a:off x="7112613" y="1169453"/>
-            <a:ext cx="1263386" cy="1280784"/>
-          </a:xfrm>
-          <a:prstGeom prst="straightConnector1">
-            <a:avLst/>
-          </a:prstGeom>
-          <a:ln>
-            <a:tailEnd type="triangle"/>
-          </a:ln>
-        </p:spPr>
-        <p:style>
-          <a:lnRef idx="1">
-            <a:schemeClr val="accent1"/>
-          </a:lnRef>
-          <a:fillRef idx="0">
-            <a:schemeClr val="accent1"/>
-          </a:fillRef>
-          <a:effectRef idx="0">
-            <a:schemeClr val="accent1"/>
-          </a:effectRef>
-          <a:fontRef idx="minor">
-            <a:schemeClr val="tx1"/>
-          </a:fontRef>
-        </p:style>
-      </p:cxnSp>
-      <p:sp>
-        <p:nvSpPr>
-          <p:cNvPr id="20" name="TextBox 19">
-            <a:extLst>
-              <a:ext uri="{FF2B5EF4-FFF2-40B4-BE49-F238E27FC236}">
-                <a16:creationId xmlns:a16="http://schemas.microsoft.com/office/drawing/2014/main" id="{5A1993FA-0EC7-4E0E-ACA7-45851603D1E8}"/>
-              </a:ext>
-            </a:extLst>
-          </p:cNvPr>
-          <p:cNvSpPr txBox="1"/>
-          <p:nvPr/>
-        </p:nvSpPr>
-        <p:spPr>
-          <a:xfrm>
-            <a:off x="2122351" y="1342451"/>
-            <a:ext cx="2742033" cy="369332"/>
-          </a:xfrm>
-          <a:prstGeom prst="rect">
-            <a:avLst/>
-          </a:prstGeom>
-          <a:solidFill>
-            <a:srgbClr val="FFFF00"/>
-          </a:solidFill>
-        </p:spPr>
-        <p:txBody>
-          <a:bodyPr wrap="none" rtlCol="0">
-            <a:spAutoFit/>
-          </a:bodyPr>
-          <a:lstStyle/>
-          <a:p>
-            <a:r>
-              <a:rPr lang="en-US" dirty="0"/>
-              <a:t>CSC3510 – software testing</a:t>
-            </a:r>
-          </a:p>
-        </p:txBody>
-      </p:sp>
-      <p:cxnSp>
-        <p:nvCxnSpPr>
-          <p:cNvPr id="21" name="Straight Arrow Connector 20">
-            <a:extLst>
-              <a:ext uri="{FF2B5EF4-FFF2-40B4-BE49-F238E27FC236}">
-                <a16:creationId xmlns:a16="http://schemas.microsoft.com/office/drawing/2014/main" id="{78B9FA28-EC07-498C-A979-5EE4EFBB39B3}"/>
-              </a:ext>
-            </a:extLst>
-          </p:cNvPr>
-          <p:cNvCxnSpPr>
-            <a:cxnSpLocks/>
-            <a:stCxn id="20" idx="2"/>
-          </p:cNvCxnSpPr>
-          <p:nvPr/>
-        </p:nvCxnSpPr>
-        <p:spPr>
-          <a:xfrm>
-            <a:off x="3493368" y="1711783"/>
-            <a:ext cx="989273" cy="1981872"/>
-          </a:xfrm>
-          <a:prstGeom prst="straightConnector1">
-            <a:avLst/>
-          </a:prstGeom>
-          <a:ln>
-            <a:tailEnd type="triangle"/>
-          </a:ln>
-        </p:spPr>
-        <p:style>
-          <a:lnRef idx="1">
-            <a:schemeClr val="accent1"/>
-          </a:lnRef>
-          <a:fillRef idx="0">
-            <a:schemeClr val="accent1"/>
-          </a:fillRef>
-          <a:effectRef idx="0">
-            <a:schemeClr val="accent1"/>
-          </a:effectRef>
-          <a:fontRef idx="minor">
-            <a:schemeClr val="tx1"/>
-          </a:fontRef>
-        </p:style>
-      </p:cxnSp>
-      <p:cxnSp>
-        <p:nvCxnSpPr>
-          <p:cNvPr id="25" name="Straight Arrow Connector 24">
-            <a:extLst>
-              <a:ext uri="{FF2B5EF4-FFF2-40B4-BE49-F238E27FC236}">
-                <a16:creationId xmlns:a16="http://schemas.microsoft.com/office/drawing/2014/main" id="{7AE412D6-E78B-4905-AA9C-F3BC11325C46}"/>
-              </a:ext>
-            </a:extLst>
-          </p:cNvPr>
-          <p:cNvCxnSpPr>
-            <a:cxnSpLocks/>
-          </p:cNvCxnSpPr>
-          <p:nvPr/>
-        </p:nvCxnSpPr>
-        <p:spPr>
-          <a:xfrm>
-            <a:off x="2846660" y="1672365"/>
-            <a:ext cx="1495158" cy="582563"/>
-          </a:xfrm>
-          <a:prstGeom prst="straightConnector1">
-            <a:avLst/>
-          </a:prstGeom>
-          <a:ln>
-            <a:tailEnd type="triangle"/>
-          </a:ln>
-        </p:spPr>
-        <p:style>
-          <a:lnRef idx="1">
-            <a:schemeClr val="accent1"/>
-          </a:lnRef>
-          <a:fillRef idx="0">
-            <a:schemeClr val="accent1"/>
-          </a:fillRef>
-          <a:effectRef idx="0">
-            <a:schemeClr val="accent1"/>
-          </a:effectRef>
-          <a:fontRef idx="minor">
-            <a:schemeClr val="tx1"/>
-          </a:fontRef>
-        </p:style>
-      </p:cxnSp>
-      <p:cxnSp>
-        <p:nvCxnSpPr>
-          <p:cNvPr id="27" name="Straight Arrow Connector 26">
-            <a:extLst>
-              <a:ext uri="{FF2B5EF4-FFF2-40B4-BE49-F238E27FC236}">
-                <a16:creationId xmlns:a16="http://schemas.microsoft.com/office/drawing/2014/main" id="{D90701EF-3889-431F-ADE1-B0C150135DAE}"/>
-              </a:ext>
-            </a:extLst>
-          </p:cNvPr>
-          <p:cNvCxnSpPr>
-            <a:cxnSpLocks/>
-            <a:stCxn id="20" idx="2"/>
-          </p:cNvCxnSpPr>
-          <p:nvPr/>
-        </p:nvCxnSpPr>
-        <p:spPr>
-          <a:xfrm>
-            <a:off x="3493368" y="1711783"/>
-            <a:ext cx="2425195" cy="1307240"/>
-          </a:xfrm>
-          <a:prstGeom prst="straightConnector1">
-            <a:avLst/>
-          </a:prstGeom>
-          <a:ln>
-            <a:tailEnd type="triangle"/>
-          </a:ln>
-        </p:spPr>
-        <p:style>
-          <a:lnRef idx="1">
-            <a:schemeClr val="accent1"/>
-          </a:lnRef>
-          <a:fillRef idx="0">
-            <a:schemeClr val="accent1"/>
-          </a:fillRef>
-          <a:effectRef idx="0">
-            <a:schemeClr val="accent1"/>
-          </a:effectRef>
-          <a:fontRef idx="minor">
-            <a:schemeClr val="tx1"/>
-          </a:fontRef>
-        </p:style>
-      </p:cxnSp>
+            <a:pPr>
+              <a:lnSpc>
+                <a:spcPct val="107000"/>
+              </a:lnSpc>
+              <a:spcAft>
+                <a:spcPts val="800"/>
+              </a:spcAft>
+            </a:pPr>
+            <a:r>
+              <a:rPr lang="en-US" dirty="0">
+                <a:latin typeface="Calibri" panose="020F0502020204030204" pitchFamily="34" charset="0"/>
+                <a:ea typeface="Calibri" panose="020F0502020204030204" pitchFamily="34" charset="0"/>
+                <a:cs typeface="Times New Roman" panose="02020603050405020304" pitchFamily="18" charset="0"/>
+              </a:rPr>
+              <a:t>Part 0 – In google, enter the following “Software Testing Jobs Chicago”. Find 1 job. </a:t>
+            </a:r>
+          </a:p>
+          <a:p>
+            <a:pPr>
+              <a:lnSpc>
+                <a:spcPct val="107000"/>
+              </a:lnSpc>
+              <a:spcAft>
+                <a:spcPts val="800"/>
+              </a:spcAft>
+            </a:pPr>
+            <a:r>
+              <a:rPr lang="en-US" dirty="0">
+                <a:latin typeface="Calibri" panose="020F0502020204030204" pitchFamily="34" charset="0"/>
+                <a:ea typeface="Calibri" panose="020F0502020204030204" pitchFamily="34" charset="0"/>
+                <a:cs typeface="Times New Roman" panose="02020603050405020304" pitchFamily="18" charset="0"/>
+              </a:rPr>
+              <a:t>In your own words … what are they looking for? </a:t>
+            </a:r>
+          </a:p>
+          <a:p>
+            <a:pPr>
+              <a:lnSpc>
+                <a:spcPct val="107000"/>
+              </a:lnSpc>
+              <a:spcAft>
+                <a:spcPts val="800"/>
+              </a:spcAft>
+            </a:pPr>
+            <a:r>
+              <a:rPr lang="en-US" dirty="0">
+                <a:latin typeface="Calibri" panose="020F0502020204030204" pitchFamily="34" charset="0"/>
+                <a:ea typeface="Calibri" panose="020F0502020204030204" pitchFamily="34" charset="0"/>
+                <a:cs typeface="Times New Roman" panose="02020603050405020304" pitchFamily="18" charset="0"/>
+              </a:rPr>
+              <a:t>List the specific technologies/skills that are needed.</a:t>
+            </a:r>
+          </a:p>
+          <a:p>
+            <a:pPr>
+              <a:lnSpc>
+                <a:spcPct val="107000"/>
+              </a:lnSpc>
+              <a:spcAft>
+                <a:spcPts val="800"/>
+              </a:spcAft>
+            </a:pPr>
+            <a:r>
+              <a:rPr lang="en-US" dirty="0">
+                <a:latin typeface="Calibri" panose="020F0502020204030204" pitchFamily="34" charset="0"/>
+                <a:ea typeface="Calibri" panose="020F0502020204030204" pitchFamily="34" charset="0"/>
+                <a:cs typeface="Times New Roman" panose="02020603050405020304" pitchFamily="18" charset="0"/>
+              </a:rPr>
+              <a:t>Report back to the group …</a:t>
+            </a:r>
+          </a:p>
+        </p:txBody>
+      </p:sp>
     </p:spTree>
     <p:extLst>
       <p:ext uri="{BB962C8B-B14F-4D97-AF65-F5344CB8AC3E}">
-        <p14:creationId xmlns:p14="http://schemas.microsoft.com/office/powerpoint/2010/main" val="3350270588"/>
+        <p14:creationId xmlns:p14="http://schemas.microsoft.com/office/powerpoint/2010/main" val="3033291010"/>
       </p:ext>
     </p:extLst>
   </p:cSld>
@@ -10056,6 +10053,10 @@
             </a:lvl9pPr>
           </a:lstStyle>
           <a:p>
+            <a:r>
+              <a:rPr lang="en-US" sz="1600" dirty="0"/>
+              <a:t/>
+            </a:r>
             <a:br>
               <a:rPr lang="en-US" sz="1600" dirty="0"/>
             </a:br>
@@ -10734,6 +10735,41 @@
       </p:sp>
       <p:sp>
         <p:nvSpPr>
+          <p:cNvPr id="3" name="Rectangle 2"/>
+          <p:cNvSpPr/>
+          <p:nvPr/>
+        </p:nvSpPr>
+        <p:spPr>
+          <a:xfrm>
+            <a:off x="948267" y="5765589"/>
+            <a:ext cx="6096000" cy="646331"/>
+          </a:xfrm>
+          <a:prstGeom prst="rect">
+            <a:avLst/>
+          </a:prstGeom>
+        </p:spPr>
+        <p:txBody>
+          <a:bodyPr>
+            <a:spAutoFit/>
+          </a:bodyPr>
+          <a:lstStyle/>
+          <a:p>
+            <a:r>
+              <a:rPr lang="en-US" b="1" dirty="0"/>
+              <a:t>The best way to establish confidence is to</a:t>
+            </a:r>
+          </a:p>
+          <a:p>
+            <a:r>
+              <a:rPr lang="en-US" b="1" dirty="0"/>
+              <a:t>   ... attempt to refute it. </a:t>
+            </a:r>
+            <a:endParaRPr lang="en-US" sz="1400" dirty="0"/>
+          </a:p>
+        </p:txBody>
+      </p:sp>
+      <p:sp>
+        <p:nvSpPr>
           <p:cNvPr id="6" name="TextBox 9">
             <a:extLst>
               <a:ext uri="{FF2B5EF4-FFF2-40B4-BE49-F238E27FC236}">
@@ -10746,8 +10782,8 @@
         </p:nvSpPr>
         <p:spPr>
           <a:xfrm>
-            <a:off x="1566300" y="5460325"/>
-            <a:ext cx="3288914" cy="1188146"/>
+            <a:off x="838200" y="5460325"/>
+            <a:ext cx="5080302" cy="923330"/>
           </a:xfrm>
           <a:prstGeom prst="rect">
             <a:avLst/>
@@ -10868,35 +10904,31 @@
           </a:lstStyle>
           <a:p>
             <a:r>
-              <a:rPr lang="en-US" sz="1400" b="1"/>
+              <a:rPr lang="en-US" sz="1800" b="1" dirty="0"/>
               <a:t>Suppose someone said </a:t>
             </a:r>
           </a:p>
           <a:p>
             <a:r>
-              <a:rPr lang="en-US" sz="1400" b="1"/>
+              <a:rPr lang="en-US" sz="1800" b="1" dirty="0"/>
               <a:t>"My Program i</a:t>
             </a:r>
             <a:r>
-              <a:rPr lang="en-US" sz="1400" b="1" baseline="0"/>
+              <a:rPr lang="en-US" sz="1800" b="1" baseline="0" dirty="0"/>
               <a:t>s perfect" </a:t>
             </a:r>
-          </a:p>
-          <a:p>
-            <a:endParaRPr lang="en-US" sz="1400" b="1" baseline="0"/>
-          </a:p>
-          <a:p>
-            <a:r>
-              <a:rPr lang="en-US" sz="1400" b="1" baseline="0"/>
-              <a:t>The best way to establish confidence is to</a:t>
-            </a:r>
-          </a:p>
-          <a:p>
-            <a:r>
-              <a:rPr lang="en-US" sz="1400" b="1" baseline="0"/>
-              <a:t>   ... attempt to refute it. </a:t>
-            </a:r>
-            <a:endParaRPr lang="en-US" sz="1100"/>
+            <a:r>
+              <a:rPr lang="en-US" sz="1800" b="1" baseline="0" dirty="0" smtClean="0"/>
+              <a:t>…how can you prove that?</a:t>
+            </a:r>
+            <a:endParaRPr lang="en-US" sz="1800" b="1" baseline="0" dirty="0"/>
+          </a:p>
+          <a:p>
+            <a:r>
+              <a:rPr lang="en-US" sz="1800" b="1" baseline="0" dirty="0" smtClean="0"/>
+              <a:t>                                                                                    </a:t>
+            </a:r>
+            <a:endParaRPr lang="en-US" sz="1800" b="1" baseline="0" dirty="0"/>
           </a:p>
         </p:txBody>
       </p:sp>
@@ -11385,6 +11417,50 @@
           </a:fontRef>
         </p:style>
       </p:cxnSp>
+      <p:sp>
+        <p:nvSpPr>
+          <p:cNvPr id="9" name="TextBox 8"/>
+          <p:cNvSpPr txBox="1"/>
+          <p:nvPr/>
+        </p:nvSpPr>
+        <p:spPr>
+          <a:xfrm>
+            <a:off x="7259407" y="566241"/>
+            <a:ext cx="3150221" cy="923330"/>
+          </a:xfrm>
+          <a:prstGeom prst="rect">
+            <a:avLst/>
+          </a:prstGeom>
+          <a:solidFill>
+            <a:schemeClr val="accent1">
+              <a:lumMod val="20000"/>
+              <a:lumOff val="80000"/>
+            </a:schemeClr>
+          </a:solidFill>
+        </p:spPr>
+        <p:txBody>
+          <a:bodyPr wrap="none" rtlCol="0">
+            <a:spAutoFit/>
+          </a:bodyPr>
+          <a:lstStyle/>
+          <a:p>
+            <a:r>
+              <a:rPr lang="en-US" dirty="0" smtClean="0"/>
+              <a:t>Do part I from Worksheet now </a:t>
+            </a:r>
+          </a:p>
+          <a:p>
+            <a:endParaRPr lang="en-US" dirty="0" smtClean="0"/>
+          </a:p>
+          <a:p>
+            <a:r>
+              <a:rPr lang="en-US" dirty="0" smtClean="0"/>
+              <a:t>What test cases recommend?</a:t>
+            </a:r>
+            <a:endParaRPr lang="en-US" dirty="0"/>
+          </a:p>
+        </p:txBody>
+      </p:sp>
     </p:spTree>
     <p:extLst>
       <p:ext uri="{BB962C8B-B14F-4D97-AF65-F5344CB8AC3E}">

</xml_diff>